<commit_message>
moved packed from de.tallence to com.tallence several adjustments for the presentation
</commit_message>
<xml_diff>
--- a/AdvancedBdd.pptx
+++ b/AdvancedBdd.pptx
@@ -5,10 +5,10 @@
     <p:sldMasterId id="2147483901" r:id="rId1"/>
   </p:sldMasterIdLst>
   <p:notesMasterIdLst>
-    <p:notesMasterId r:id="rId14"/>
+    <p:notesMasterId r:id="rId16"/>
   </p:notesMasterIdLst>
   <p:handoutMasterIdLst>
-    <p:handoutMasterId r:id="rId15"/>
+    <p:handoutMasterId r:id="rId17"/>
   </p:handoutMasterIdLst>
   <p:sldIdLst>
     <p:sldId id="256" r:id="rId2"/>
@@ -16,23 +16,25 @@
     <p:sldId id="262" r:id="rId4"/>
     <p:sldId id="258" r:id="rId5"/>
     <p:sldId id="267" r:id="rId6"/>
-    <p:sldId id="261" r:id="rId7"/>
-    <p:sldId id="259" r:id="rId8"/>
-    <p:sldId id="270" r:id="rId9"/>
-    <p:sldId id="263" r:id="rId10"/>
-    <p:sldId id="260" r:id="rId11"/>
-    <p:sldId id="265" r:id="rId12"/>
-    <p:sldId id="268" r:id="rId13"/>
+    <p:sldId id="271" r:id="rId7"/>
+    <p:sldId id="272" r:id="rId8"/>
+    <p:sldId id="261" r:id="rId9"/>
+    <p:sldId id="259" r:id="rId10"/>
+    <p:sldId id="270" r:id="rId11"/>
+    <p:sldId id="263" r:id="rId12"/>
+    <p:sldId id="260" r:id="rId13"/>
+    <p:sldId id="265" r:id="rId14"/>
+    <p:sldId id="268" r:id="rId15"/>
   </p:sldIdLst>
   <p:sldSz cx="12190413" cy="6858000"/>
   <p:notesSz cx="6858000" cy="9144000"/>
   <p:embeddedFontLst>
     <p:embeddedFont>
       <p:font typeface="Consolas" panose="020B0609020204030204" pitchFamily="49" charset="0"/>
-      <p:regular r:id="rId16"/>
-      <p:bold r:id="rId17"/>
-      <p:italic r:id="rId18"/>
-      <p:boldItalic r:id="rId19"/>
+      <p:regular r:id="rId18"/>
+      <p:bold r:id="rId19"/>
+      <p:italic r:id="rId20"/>
+      <p:boldItalic r:id="rId21"/>
     </p:embeddedFont>
   </p:embeddedFontLst>
   <p:defaultTextStyle>
@@ -1328,11 +1330,11 @@
     <dgm:cxn modelId="{6FC7A033-06D8-8847-8B51-2F127EEBBD2F}" type="presOf" srcId="{42B6B9AF-C619-AA43-85BF-FA13732E137D}" destId="{E08162C6-7FB9-9F47-9612-90AE120CFEED}" srcOrd="0" destOrd="0" presId="urn:microsoft.com/office/officeart/2005/8/layout/process3"/>
     <dgm:cxn modelId="{AEB5BA34-E616-FA42-88AE-F052F5E294FF}" type="presOf" srcId="{7EEB7645-D8C0-F949-AED0-23F7C5787DE7}" destId="{4CF06C2E-94F2-7743-9CEE-201CFB05BBB7}" srcOrd="1" destOrd="0" presId="urn:microsoft.com/office/officeart/2005/8/layout/process3"/>
     <dgm:cxn modelId="{CC04C23C-6EF9-E04C-B20B-D563443C4C7B}" srcId="{9FA9E3EE-A48A-8D46-848E-B05C1EBA58C1}" destId="{2472D38B-F3F7-6E47-85A0-2D8BBE823CFB}" srcOrd="0" destOrd="0" parTransId="{822659DE-9593-484A-96EA-9EBCEE028A23}" sibTransId="{2A43DB30-D758-6147-B1D5-829ACC88C090}"/>
+    <dgm:cxn modelId="{90846A5B-225A-FB4B-8C39-2C034D122BA2}" srcId="{8718F18F-09C8-4846-86CE-94CCAFDE41E2}" destId="{42B6B9AF-C619-AA43-85BF-FA13732E137D}" srcOrd="0" destOrd="0" parTransId="{00A75D35-D44E-6544-93A2-CBC54621D939}" sibTransId="{736B5078-080A-744E-A45D-FEEB63A627D0}"/>
     <dgm:cxn modelId="{F5A1EC48-A5F9-4441-9CE2-E5395B8E62AC}" type="presOf" srcId="{E86FFC00-34D0-B240-8408-1D4581E81907}" destId="{5D1D52D0-6583-9348-99C1-79E9A1CF8FD4}" srcOrd="1" destOrd="0" presId="urn:microsoft.com/office/officeart/2005/8/layout/process3"/>
+    <dgm:cxn modelId="{B6F9664C-DBF4-2942-8503-369F75E91BDA}" type="presOf" srcId="{BB5DA5FB-D69E-A940-86F0-9135C89ECDBF}" destId="{987979C1-E718-6841-8AF8-938B1A4A9961}" srcOrd="0" destOrd="0" presId="urn:microsoft.com/office/officeart/2005/8/layout/process3"/>
     <dgm:cxn modelId="{76294B4C-5AE3-B841-B41C-4966F444631E}" srcId="{B2FCB7CF-90E6-2E42-B330-CAE2DE9B7E41}" destId="{9FA9E3EE-A48A-8D46-848E-B05C1EBA58C1}" srcOrd="0" destOrd="0" parTransId="{204545F3-B202-614B-8E9B-A2643058AC7A}" sibTransId="{F9D481DF-D38A-344E-BA35-1B9E20B5B190}"/>
-    <dgm:cxn modelId="{B6F9664C-DBF4-2942-8503-369F75E91BDA}" type="presOf" srcId="{BB5DA5FB-D69E-A940-86F0-9135C89ECDBF}" destId="{987979C1-E718-6841-8AF8-938B1A4A9961}" srcOrd="0" destOrd="0" presId="urn:microsoft.com/office/officeart/2005/8/layout/process3"/>
     <dgm:cxn modelId="{83EEB34C-C0FE-4F4C-A446-2E8B2E0460C2}" srcId="{E86FFC00-34D0-B240-8408-1D4581E81907}" destId="{BB5DA5FB-D69E-A940-86F0-9135C89ECDBF}" srcOrd="0" destOrd="0" parTransId="{15DCF61A-307A-DB45-BF3E-7376AABB1111}" sibTransId="{72645D7A-E4E9-B340-AB9E-15B0923E9813}"/>
-    <dgm:cxn modelId="{90846A5B-225A-FB4B-8C39-2C034D122BA2}" srcId="{8718F18F-09C8-4846-86CE-94CCAFDE41E2}" destId="{42B6B9AF-C619-AA43-85BF-FA13732E137D}" srcOrd="0" destOrd="0" parTransId="{00A75D35-D44E-6544-93A2-CBC54621D939}" sibTransId="{736B5078-080A-744E-A45D-FEEB63A627D0}"/>
     <dgm:cxn modelId="{70A4DA7A-7234-B24A-A713-FB5AB915A6CC}" type="presOf" srcId="{8718F18F-09C8-4846-86CE-94CCAFDE41E2}" destId="{B77E1770-32FA-E24E-97E2-B515A085F7C3}" srcOrd="0" destOrd="0" presId="urn:microsoft.com/office/officeart/2005/8/layout/process3"/>
     <dgm:cxn modelId="{7269407D-53E6-B343-8EE2-7A20AC2E4D81}" type="presOf" srcId="{E86FFC00-34D0-B240-8408-1D4581E81907}" destId="{1AEAEB28-5108-6245-A73A-7C261BDEA58B}" srcOrd="0" destOrd="0" presId="urn:microsoft.com/office/officeart/2005/8/layout/process3"/>
     <dgm:cxn modelId="{D239BA83-7F20-8643-BEF3-ABA78DF50E88}" type="presOf" srcId="{9FA9E3EE-A48A-8D46-848E-B05C1EBA58C1}" destId="{E7346FC4-68DA-C548-91D9-1E0DA8FD1650}" srcOrd="0" destOrd="0" presId="urn:microsoft.com/office/officeart/2005/8/layout/process3"/>
@@ -3805,7 +3807,12 @@
             <p:ph type="sldImg"/>
           </p:nvPr>
         </p:nvSpPr>
-        <p:spPr/>
+        <p:spPr>
+          <a:xfrm>
+            <a:off x="360363" y="431800"/>
+            <a:ext cx="6137275" cy="3454400"/>
+          </a:xfrm>
+        </p:spPr>
       </p:sp>
       <p:sp>
         <p:nvSpPr>
@@ -3843,7 +3850,7 @@
           <a:p>
             <a:fld id="{92DA5471-CC57-402A-9527-36A1D012F698}" type="slidenum">
               <a:rPr lang="de-DE" noProof="0" smtClean="0"/>
-              <a:t>5</a:t>
+              <a:t>4</a:t>
             </a:fld>
             <a:endParaRPr lang="de-DE" noProof="0" dirty="0"/>
           </a:p>
@@ -3852,7 +3859,7 @@
     </p:spTree>
     <p:extLst>
       <p:ext uri="{BB962C8B-B14F-4D97-AF65-F5344CB8AC3E}">
-        <p14:creationId xmlns:p14="http://schemas.microsoft.com/office/powerpoint/2010/main" val="1095088852"/>
+        <p14:creationId xmlns:p14="http://schemas.microsoft.com/office/powerpoint/2010/main" val="3575978313"/>
       </p:ext>
     </p:extLst>
   </p:cSld>
@@ -3911,6 +3918,273 @@
           <a:bodyPr/>
           <a:lstStyle/>
           <a:p>
+            <a:endParaRPr lang="de-DE" dirty="0"/>
+          </a:p>
+        </p:txBody>
+      </p:sp>
+      <p:sp>
+        <p:nvSpPr>
+          <p:cNvPr id="4" name="Foliennummernplatzhalter 3"/>
+          <p:cNvSpPr>
+            <a:spLocks noGrp="1"/>
+          </p:cNvSpPr>
+          <p:nvPr>
+            <p:ph type="sldNum" sz="quarter" idx="5"/>
+          </p:nvPr>
+        </p:nvSpPr>
+        <p:spPr/>
+        <p:txBody>
+          <a:bodyPr/>
+          <a:lstStyle/>
+          <a:p>
+            <a:fld id="{92DA5471-CC57-402A-9527-36A1D012F698}" type="slidenum">
+              <a:rPr lang="de-DE" noProof="0" smtClean="0"/>
+              <a:t>5</a:t>
+            </a:fld>
+            <a:endParaRPr lang="de-DE" noProof="0" dirty="0"/>
+          </a:p>
+        </p:txBody>
+      </p:sp>
+    </p:spTree>
+    <p:extLst>
+      <p:ext uri="{BB962C8B-B14F-4D97-AF65-F5344CB8AC3E}">
+        <p14:creationId xmlns:p14="http://schemas.microsoft.com/office/powerpoint/2010/main" val="1095088852"/>
+      </p:ext>
+    </p:extLst>
+  </p:cSld>
+  <p:clrMapOvr>
+    <a:masterClrMapping/>
+  </p:clrMapOvr>
+</p:notes>
+</file>
+
+<file path=ppt/notesSlides/notesSlide3.xml><?xml version="1.0" encoding="utf-8"?>
+<p:notes xmlns:a="http://schemas.openxmlformats.org/drawingml/2006/main" xmlns:r="http://schemas.openxmlformats.org/officeDocument/2006/relationships" xmlns:p="http://schemas.openxmlformats.org/presentationml/2006/main">
+  <p:cSld>
+    <p:spTree>
+      <p:nvGrpSpPr>
+        <p:cNvPr id="1" name=""/>
+        <p:cNvGrpSpPr/>
+        <p:nvPr/>
+      </p:nvGrpSpPr>
+      <p:grpSpPr>
+        <a:xfrm>
+          <a:off x="0" y="0"/>
+          <a:ext cx="0" cy="0"/>
+          <a:chOff x="0" y="0"/>
+          <a:chExt cx="0" cy="0"/>
+        </a:xfrm>
+      </p:grpSpPr>
+      <p:sp>
+        <p:nvSpPr>
+          <p:cNvPr id="2" name="Folienbildplatzhalter 1"/>
+          <p:cNvSpPr>
+            <a:spLocks noGrp="1" noRot="1" noChangeAspect="1"/>
+          </p:cNvSpPr>
+          <p:nvPr>
+            <p:ph type="sldImg"/>
+          </p:nvPr>
+        </p:nvSpPr>
+        <p:spPr>
+          <a:xfrm>
+            <a:off x="360363" y="431800"/>
+            <a:ext cx="6137275" cy="3454400"/>
+          </a:xfrm>
+        </p:spPr>
+      </p:sp>
+      <p:sp>
+        <p:nvSpPr>
+          <p:cNvPr id="3" name="Notizenplatzhalter 2"/>
+          <p:cNvSpPr>
+            <a:spLocks noGrp="1"/>
+          </p:cNvSpPr>
+          <p:nvPr>
+            <p:ph type="body" idx="1"/>
+          </p:nvPr>
+        </p:nvSpPr>
+        <p:spPr/>
+        <p:txBody>
+          <a:bodyPr/>
+          <a:lstStyle/>
+          <a:p>
+            <a:endParaRPr lang="de-DE" dirty="0"/>
+          </a:p>
+        </p:txBody>
+      </p:sp>
+      <p:sp>
+        <p:nvSpPr>
+          <p:cNvPr id="4" name="Foliennummernplatzhalter 3"/>
+          <p:cNvSpPr>
+            <a:spLocks noGrp="1"/>
+          </p:cNvSpPr>
+          <p:nvPr>
+            <p:ph type="sldNum" sz="quarter" idx="5"/>
+          </p:nvPr>
+        </p:nvSpPr>
+        <p:spPr/>
+        <p:txBody>
+          <a:bodyPr/>
+          <a:lstStyle/>
+          <a:p>
+            <a:fld id="{92DA5471-CC57-402A-9527-36A1D012F698}" type="slidenum">
+              <a:rPr lang="de-DE" noProof="0" smtClean="0"/>
+              <a:t>6</a:t>
+            </a:fld>
+            <a:endParaRPr lang="de-DE" noProof="0" dirty="0"/>
+          </a:p>
+        </p:txBody>
+      </p:sp>
+    </p:spTree>
+    <p:extLst>
+      <p:ext uri="{BB962C8B-B14F-4D97-AF65-F5344CB8AC3E}">
+        <p14:creationId xmlns:p14="http://schemas.microsoft.com/office/powerpoint/2010/main" val="1783615446"/>
+      </p:ext>
+    </p:extLst>
+  </p:cSld>
+  <p:clrMapOvr>
+    <a:masterClrMapping/>
+  </p:clrMapOvr>
+</p:notes>
+</file>
+
+<file path=ppt/notesSlides/notesSlide4.xml><?xml version="1.0" encoding="utf-8"?>
+<p:notes xmlns:a="http://schemas.openxmlformats.org/drawingml/2006/main" xmlns:r="http://schemas.openxmlformats.org/officeDocument/2006/relationships" xmlns:p="http://schemas.openxmlformats.org/presentationml/2006/main">
+  <p:cSld>
+    <p:spTree>
+      <p:nvGrpSpPr>
+        <p:cNvPr id="1" name=""/>
+        <p:cNvGrpSpPr/>
+        <p:nvPr/>
+      </p:nvGrpSpPr>
+      <p:grpSpPr>
+        <a:xfrm>
+          <a:off x="0" y="0"/>
+          <a:ext cx="0" cy="0"/>
+          <a:chOff x="0" y="0"/>
+          <a:chExt cx="0" cy="0"/>
+        </a:xfrm>
+      </p:grpSpPr>
+      <p:sp>
+        <p:nvSpPr>
+          <p:cNvPr id="2" name="Folienbildplatzhalter 1"/>
+          <p:cNvSpPr>
+            <a:spLocks noGrp="1" noRot="1" noChangeAspect="1"/>
+          </p:cNvSpPr>
+          <p:nvPr>
+            <p:ph type="sldImg"/>
+          </p:nvPr>
+        </p:nvSpPr>
+        <p:spPr>
+          <a:xfrm>
+            <a:off x="360363" y="431800"/>
+            <a:ext cx="6137275" cy="3454400"/>
+          </a:xfrm>
+        </p:spPr>
+      </p:sp>
+      <p:sp>
+        <p:nvSpPr>
+          <p:cNvPr id="3" name="Notizenplatzhalter 2"/>
+          <p:cNvSpPr>
+            <a:spLocks noGrp="1"/>
+          </p:cNvSpPr>
+          <p:nvPr>
+            <p:ph type="body" idx="1"/>
+          </p:nvPr>
+        </p:nvSpPr>
+        <p:spPr/>
+        <p:txBody>
+          <a:bodyPr/>
+          <a:lstStyle/>
+          <a:p>
+            <a:endParaRPr lang="de-DE" dirty="0"/>
+          </a:p>
+        </p:txBody>
+      </p:sp>
+      <p:sp>
+        <p:nvSpPr>
+          <p:cNvPr id="4" name="Foliennummernplatzhalter 3"/>
+          <p:cNvSpPr>
+            <a:spLocks noGrp="1"/>
+          </p:cNvSpPr>
+          <p:nvPr>
+            <p:ph type="sldNum" sz="quarter" idx="5"/>
+          </p:nvPr>
+        </p:nvSpPr>
+        <p:spPr/>
+        <p:txBody>
+          <a:bodyPr/>
+          <a:lstStyle/>
+          <a:p>
+            <a:fld id="{92DA5471-CC57-402A-9527-36A1D012F698}" type="slidenum">
+              <a:rPr lang="de-DE" noProof="0" smtClean="0"/>
+              <a:t>7</a:t>
+            </a:fld>
+            <a:endParaRPr lang="de-DE" noProof="0" dirty="0"/>
+          </a:p>
+        </p:txBody>
+      </p:sp>
+    </p:spTree>
+    <p:extLst>
+      <p:ext uri="{BB962C8B-B14F-4D97-AF65-F5344CB8AC3E}">
+        <p14:creationId xmlns:p14="http://schemas.microsoft.com/office/powerpoint/2010/main" val="974130862"/>
+      </p:ext>
+    </p:extLst>
+  </p:cSld>
+  <p:clrMapOvr>
+    <a:masterClrMapping/>
+  </p:clrMapOvr>
+</p:notes>
+</file>
+
+<file path=ppt/notesSlides/notesSlide5.xml><?xml version="1.0" encoding="utf-8"?>
+<p:notes xmlns:a="http://schemas.openxmlformats.org/drawingml/2006/main" xmlns:r="http://schemas.openxmlformats.org/officeDocument/2006/relationships" xmlns:p="http://schemas.openxmlformats.org/presentationml/2006/main">
+  <p:cSld>
+    <p:spTree>
+      <p:nvGrpSpPr>
+        <p:cNvPr id="1" name=""/>
+        <p:cNvGrpSpPr/>
+        <p:nvPr/>
+      </p:nvGrpSpPr>
+      <p:grpSpPr>
+        <a:xfrm>
+          <a:off x="0" y="0"/>
+          <a:ext cx="0" cy="0"/>
+          <a:chOff x="0" y="0"/>
+          <a:chExt cx="0" cy="0"/>
+        </a:xfrm>
+      </p:grpSpPr>
+      <p:sp>
+        <p:nvSpPr>
+          <p:cNvPr id="2" name="Folienbildplatzhalter 1"/>
+          <p:cNvSpPr>
+            <a:spLocks noGrp="1" noRot="1" noChangeAspect="1"/>
+          </p:cNvSpPr>
+          <p:nvPr>
+            <p:ph type="sldImg"/>
+          </p:nvPr>
+        </p:nvSpPr>
+        <p:spPr>
+          <a:xfrm>
+            <a:off x="360363" y="431800"/>
+            <a:ext cx="6137275" cy="3454400"/>
+          </a:xfrm>
+        </p:spPr>
+      </p:sp>
+      <p:sp>
+        <p:nvSpPr>
+          <p:cNvPr id="3" name="Notizenplatzhalter 2"/>
+          <p:cNvSpPr>
+            <a:spLocks noGrp="1"/>
+          </p:cNvSpPr>
+          <p:nvPr>
+            <p:ph type="body" idx="1"/>
+          </p:nvPr>
+        </p:nvSpPr>
+        <p:spPr/>
+        <p:txBody>
+          <a:bodyPr/>
+          <a:lstStyle/>
+          <a:p>
             <a:pPr marL="342900" indent="-342900">
               <a:buFont typeface="+mj-lt"/>
               <a:buAutoNum type="arabicPeriod"/>
@@ -4134,7 +4408,7 @@
           <a:p>
             <a:fld id="{92DA5471-CC57-402A-9527-36A1D012F698}" type="slidenum">
               <a:rPr lang="de-DE" noProof="0" smtClean="0"/>
-              <a:t>11</a:t>
+              <a:t>13</a:t>
             </a:fld>
             <a:endParaRPr lang="de-DE" noProof="0" dirty="0"/>
           </a:p>
@@ -6157,7 +6431,7 @@
             <a:fld id="{7FC88BA9-6F9E-4215-AE89-45AC6BCA1B0E}" type="datetime1">
               <a:rPr lang="de-DE" smtClean="0"/>
               <a:pPr/>
-              <a:t>29.10.19</a:t>
+              <a:t>25.11.2019</a:t>
             </a:fld>
             <a:endParaRPr lang="de-DE" dirty="0"/>
           </a:p>
@@ -7444,7 +7718,7 @@
           <a:p>
             <a:fld id="{6FEC6909-2C01-40CF-9626-2CD40C8FE822}" type="datetime1">
               <a:rPr lang="de-DE" noProof="0" smtClean="0"/>
-              <a:t>29.10.19</a:t>
+              <a:t>25.11.2019</a:t>
             </a:fld>
             <a:endParaRPr lang="de-DE" noProof="0" dirty="0"/>
           </a:p>
@@ -8516,7 +8790,7 @@
           <a:p>
             <a:fld id="{6FEC6909-2C01-40CF-9626-2CD40C8FE822}" type="datetime1">
               <a:rPr lang="de-DE" noProof="0" smtClean="0"/>
-              <a:t>29.10.19</a:t>
+              <a:t>25.11.2019</a:t>
             </a:fld>
             <a:endParaRPr lang="de-DE" noProof="0" dirty="0"/>
           </a:p>
@@ -9432,7 +9706,7 @@
           <a:p>
             <a:fld id="{6FEC6909-2C01-40CF-9626-2CD40C8FE822}" type="datetime1">
               <a:rPr lang="de-DE" noProof="0" smtClean="0"/>
-              <a:t>29.10.19</a:t>
+              <a:t>25.11.2019</a:t>
             </a:fld>
             <a:endParaRPr lang="de-DE" noProof="0" dirty="0"/>
           </a:p>
@@ -10643,7 +10917,7 @@
           <a:p>
             <a:fld id="{6FEC6909-2C01-40CF-9626-2CD40C8FE822}" type="datetime1">
               <a:rPr lang="de-DE" noProof="0" smtClean="0"/>
-              <a:t>29.10.19</a:t>
+              <a:t>25.11.2019</a:t>
             </a:fld>
             <a:endParaRPr lang="de-DE" noProof="0" dirty="0"/>
           </a:p>
@@ -12097,7 +12371,7 @@
           <a:p>
             <a:fld id="{9AFA0DE8-8033-462D-BDBF-CD1E1FDE3CA3}" type="datetime1">
               <a:rPr lang="de-DE" noProof="0" smtClean="0"/>
-              <a:t>29.10.19</a:t>
+              <a:t>25.11.2019</a:t>
             </a:fld>
             <a:endParaRPr lang="de-DE" noProof="0" dirty="0"/>
           </a:p>
@@ -12747,7 +13021,7 @@
           <a:p>
             <a:fld id="{0F71BE61-C023-4ED4-BECD-45A03B55F882}" type="datetime1">
               <a:rPr lang="de-DE" noProof="0" smtClean="0"/>
-              <a:t>29.10.19</a:t>
+              <a:t>25.11.2019</a:t>
             </a:fld>
             <a:endParaRPr lang="de-DE" noProof="0" dirty="0"/>
           </a:p>
@@ -13058,7 +13332,7 @@
           <a:p>
             <a:fld id="{154C7814-F218-4D9E-8E58-25588F0986B1}" type="datetime1">
               <a:rPr lang="de-DE" noProof="0" smtClean="0"/>
-              <a:t>29.10.19</a:t>
+              <a:t>25.11.2019</a:t>
             </a:fld>
             <a:endParaRPr lang="de-DE" noProof="0" dirty="0"/>
           </a:p>
@@ -13804,7 +14078,7 @@
           <a:p>
             <a:fld id="{1DA5372B-8290-4F29-B014-C1FC8CBE3BE6}" type="datetime1">
               <a:rPr lang="de-DE" noProof="0" smtClean="0"/>
-              <a:t>29.10.19</a:t>
+              <a:t>25.11.2019</a:t>
             </a:fld>
             <a:endParaRPr lang="de-DE" noProof="0" dirty="0"/>
           </a:p>
@@ -14191,7 +14465,7 @@
           <a:p>
             <a:fld id="{70EF8492-ADB9-4EBE-9A60-E55C77C98726}" type="datetime1">
               <a:rPr lang="de-DE" noProof="0" smtClean="0"/>
-              <a:t>29.10.19</a:t>
+              <a:t>25.11.2019</a:t>
             </a:fld>
             <a:endParaRPr lang="de-DE" noProof="0" dirty="0"/>
           </a:p>
@@ -14652,7 +14926,7 @@
           <a:p>
             <a:fld id="{70EF8492-ADB9-4EBE-9A60-E55C77C98726}" type="datetime1">
               <a:rPr lang="de-DE" noProof="0" smtClean="0"/>
-              <a:t>29.10.19</a:t>
+              <a:t>25.11.2019</a:t>
             </a:fld>
             <a:endParaRPr lang="de-DE" noProof="0" dirty="0"/>
           </a:p>
@@ -15113,7 +15387,7 @@
           <a:p>
             <a:fld id="{70EF8492-ADB9-4EBE-9A60-E55C77C98726}" type="datetime1">
               <a:rPr lang="de-DE" noProof="0" smtClean="0"/>
-              <a:t>29.10.19</a:t>
+              <a:t>25.11.2019</a:t>
             </a:fld>
             <a:endParaRPr lang="de-DE" noProof="0" dirty="0"/>
           </a:p>
@@ -15574,7 +15848,7 @@
           <a:p>
             <a:fld id="{70EF8492-ADB9-4EBE-9A60-E55C77C98726}" type="datetime1">
               <a:rPr lang="de-DE" noProof="0" smtClean="0"/>
-              <a:t>29.10.19</a:t>
+              <a:t>25.11.2019</a:t>
             </a:fld>
             <a:endParaRPr lang="de-DE" noProof="0" dirty="0"/>
           </a:p>
@@ -15961,7 +16235,7 @@
           <a:p>
             <a:fld id="{70EF8492-ADB9-4EBE-9A60-E55C77C98726}" type="datetime1">
               <a:rPr lang="de-DE" noProof="0" smtClean="0"/>
-              <a:t>29.10.19</a:t>
+              <a:t>25.11.2019</a:t>
             </a:fld>
             <a:endParaRPr lang="de-DE" noProof="0" dirty="0"/>
           </a:p>
@@ -16367,7 +16641,7 @@
           <a:p>
             <a:fld id="{70EF8492-ADB9-4EBE-9A60-E55C77C98726}" type="datetime1">
               <a:rPr lang="de-DE" noProof="0" smtClean="0"/>
-              <a:t>29.10.19</a:t>
+              <a:t>25.11.2019</a:t>
             </a:fld>
             <a:endParaRPr lang="de-DE" noProof="0" dirty="0"/>
           </a:p>
@@ -16809,7 +17083,7 @@
           <a:p>
             <a:fld id="{05B3DBBF-4A8C-46E8-A0AB-E0735B148AED}" type="datetime1">
               <a:rPr lang="de-DE" noProof="0" smtClean="0"/>
-              <a:t>29.10.19</a:t>
+              <a:t>25.11.2019</a:t>
             </a:fld>
             <a:endParaRPr lang="de-DE" noProof="0" dirty="0"/>
           </a:p>
@@ -17236,7 +17510,7 @@
           <a:p>
             <a:fld id="{52FAB3FD-4E6C-46E0-B1BD-C93EFC10EB33}" type="datetime1">
               <a:rPr lang="de-DE" noProof="0" smtClean="0"/>
-              <a:t>29.10.19</a:t>
+              <a:t>25.11.2019</a:t>
             </a:fld>
             <a:endParaRPr lang="de-DE" noProof="0" dirty="0"/>
           </a:p>
@@ -17664,7 +17938,7 @@
           <a:p>
             <a:fld id="{BA4831C8-84E6-4639-B768-66D96F272C03}" type="datetime1">
               <a:rPr lang="de-DE" noProof="0" smtClean="0"/>
-              <a:t>29.10.19</a:t>
+              <a:t>25.11.2019</a:t>
             </a:fld>
             <a:endParaRPr lang="de-DE" noProof="0" dirty="0"/>
           </a:p>
@@ -18404,7 +18678,7 @@
           <a:p>
             <a:fld id="{9D85A577-AB73-44DD-ABC0-BFB8B3497DED}" type="datetime1">
               <a:rPr lang="de-DE" noProof="0" smtClean="0"/>
-              <a:t>29.10.19</a:t>
+              <a:t>25.11.2019</a:t>
             </a:fld>
             <a:endParaRPr lang="de-DE" noProof="0" dirty="0"/>
           </a:p>
@@ -18887,7 +19161,7 @@
           <a:p>
             <a:fld id="{BA4831C8-84E6-4639-B768-66D96F272C03}" type="datetime1">
               <a:rPr lang="de-DE" noProof="0" smtClean="0"/>
-              <a:t>29.10.19</a:t>
+              <a:t>25.11.2019</a:t>
             </a:fld>
             <a:endParaRPr lang="de-DE" noProof="0" dirty="0"/>
           </a:p>
@@ -19334,7 +19608,7 @@
           <a:p>
             <a:fld id="{70EF8492-ADB9-4EBE-9A60-E55C77C98726}" type="datetime1">
               <a:rPr lang="de-DE" noProof="0" smtClean="0"/>
-              <a:t>29.10.19</a:t>
+              <a:t>25.11.2019</a:t>
             </a:fld>
             <a:endParaRPr lang="de-DE" noProof="0" dirty="0"/>
           </a:p>
@@ -19761,7 +20035,7 @@
           <a:p>
             <a:fld id="{1DA5372B-8290-4F29-B014-C1FC8CBE3BE6}" type="datetime1">
               <a:rPr lang="de-DE" noProof="0" smtClean="0"/>
-              <a:t>29.10.19</a:t>
+              <a:t>25.11.2019</a:t>
             </a:fld>
             <a:endParaRPr lang="de-DE" noProof="0" dirty="0"/>
           </a:p>
@@ -20229,7 +20503,7 @@
           <a:p>
             <a:fld id="{1DA5372B-8290-4F29-B014-C1FC8CBE3BE6}" type="datetime1">
               <a:rPr lang="de-DE" noProof="0" smtClean="0"/>
-              <a:t>29.10.19</a:t>
+              <a:t>25.11.2019</a:t>
             </a:fld>
             <a:endParaRPr lang="de-DE" noProof="0" dirty="0"/>
           </a:p>
@@ -20733,7 +21007,7 @@
           <a:p>
             <a:fld id="{3621CD1E-4595-42C3-BFF0-83D0896B7E8A}" type="datetime1">
               <a:rPr lang="de-DE" noProof="0" smtClean="0"/>
-              <a:t>29.10.19</a:t>
+              <a:t>25.11.2019</a:t>
             </a:fld>
             <a:endParaRPr lang="de-DE" noProof="0" dirty="0"/>
           </a:p>
@@ -21202,7 +21476,7 @@
           <a:p>
             <a:fld id="{1DA5372B-8290-4F29-B014-C1FC8CBE3BE6}" type="datetime1">
               <a:rPr lang="de-DE" noProof="0" smtClean="0"/>
-              <a:t>29.10.19</a:t>
+              <a:t>25.11.2019</a:t>
             </a:fld>
             <a:endParaRPr lang="de-DE" noProof="0" dirty="0"/>
           </a:p>
@@ -21711,7 +21985,7 @@
           <a:p>
             <a:fld id="{70EF8492-ADB9-4EBE-9A60-E55C77C98726}" type="datetime1">
               <a:rPr lang="de-DE" noProof="0" smtClean="0"/>
-              <a:t>29.10.19</a:t>
+              <a:t>25.11.2019</a:t>
             </a:fld>
             <a:endParaRPr lang="de-DE" noProof="0" dirty="0"/>
           </a:p>
@@ -22191,7 +22465,7 @@
           <a:p>
             <a:fld id="{8F698533-FC6E-4163-A8E0-9190274D324A}" type="datetime1">
               <a:rPr lang="de-DE" noProof="0" smtClean="0"/>
-              <a:t>29.10.19</a:t>
+              <a:t>25.11.2019</a:t>
             </a:fld>
             <a:endParaRPr lang="de-DE" noProof="0" dirty="0"/>
           </a:p>
@@ -22682,7 +22956,7 @@
           <a:p>
             <a:fld id="{8F698533-FC6E-4163-A8E0-9190274D324A}" type="datetime1">
               <a:rPr lang="de-DE" noProof="0" smtClean="0"/>
-              <a:t>29.10.19</a:t>
+              <a:t>25.11.2019</a:t>
             </a:fld>
             <a:endParaRPr lang="de-DE" noProof="0" dirty="0"/>
           </a:p>
@@ -23467,7 +23741,7 @@
           <a:p>
             <a:fld id="{50A86C45-CD1A-44AA-99BA-C8001C00C2F1}" type="datetime1">
               <a:rPr lang="de-DE" noProof="0" smtClean="0"/>
-              <a:t>29.10.19</a:t>
+              <a:t>25.11.2019</a:t>
             </a:fld>
             <a:endParaRPr lang="de-DE" noProof="0" dirty="0"/>
           </a:p>
@@ -24102,7 +24376,7 @@
           <a:p>
             <a:fld id="{F807D330-5B89-43D0-9D03-357C4C787AFF}" type="datetime1">
               <a:rPr lang="de-DE" noProof="0" smtClean="0"/>
-              <a:t>29.10.19</a:t>
+              <a:t>25.11.2019</a:t>
             </a:fld>
             <a:endParaRPr lang="de-DE" noProof="0" dirty="0"/>
           </a:p>
@@ -24673,7 +24947,7 @@
           <a:p>
             <a:fld id="{DDA146EC-6F84-4175-AEE8-BACFBC2394F6}" type="datetime1">
               <a:rPr lang="de-DE" noProof="0" smtClean="0"/>
-              <a:t>29.10.19</a:t>
+              <a:t>25.11.2019</a:t>
             </a:fld>
             <a:endParaRPr lang="de-DE" noProof="0" dirty="0"/>
           </a:p>
@@ -25361,7 +25635,7 @@
           <a:p>
             <a:fld id="{F807D330-5B89-43D0-9D03-357C4C787AFF}" type="datetime1">
               <a:rPr lang="de-DE" noProof="0" smtClean="0"/>
-              <a:t>29.10.19</a:t>
+              <a:t>25.11.2019</a:t>
             </a:fld>
             <a:endParaRPr lang="de-DE" noProof="0" dirty="0"/>
           </a:p>
@@ -25932,7 +26206,7 @@
           <a:p>
             <a:fld id="{DDA146EC-6F84-4175-AEE8-BACFBC2394F6}" type="datetime1">
               <a:rPr lang="de-DE" noProof="0" smtClean="0"/>
-              <a:t>29.10.19</a:t>
+              <a:t>25.11.2019</a:t>
             </a:fld>
             <a:endParaRPr lang="de-DE" noProof="0" dirty="0"/>
           </a:p>
@@ -26453,7 +26727,7 @@
           <a:p>
             <a:fld id="{8F698533-FC6E-4163-A8E0-9190274D324A}" type="datetime1">
               <a:rPr lang="de-DE" noProof="0" smtClean="0"/>
-              <a:t>29.10.19</a:t>
+              <a:t>25.11.2019</a:t>
             </a:fld>
             <a:endParaRPr lang="de-DE" noProof="0" dirty="0"/>
           </a:p>
@@ -27018,7 +27292,7 @@
           <a:p>
             <a:fld id="{70EF8492-ADB9-4EBE-9A60-E55C77C98726}" type="datetime1">
               <a:rPr lang="de-DE" noProof="0" smtClean="0"/>
-              <a:t>29.10.19</a:t>
+              <a:t>25.11.2019</a:t>
             </a:fld>
             <a:endParaRPr lang="de-DE" noProof="0" dirty="0"/>
           </a:p>
@@ -27619,7 +27893,7 @@
           <a:p>
             <a:fld id="{70EF8492-ADB9-4EBE-9A60-E55C77C98726}" type="datetime1">
               <a:rPr lang="de-DE" noProof="0" smtClean="0"/>
-              <a:t>29.10.19</a:t>
+              <a:t>25.11.2019</a:t>
             </a:fld>
             <a:endParaRPr lang="de-DE" noProof="0" dirty="0"/>
           </a:p>
@@ -28313,7 +28587,7 @@
           <a:p>
             <a:fld id="{70EF8492-ADB9-4EBE-9A60-E55C77C98726}" type="datetime1">
               <a:rPr lang="de-DE" noProof="0" smtClean="0"/>
-              <a:t>29.10.19</a:t>
+              <a:t>25.11.2019</a:t>
             </a:fld>
             <a:endParaRPr lang="de-DE" noProof="0" dirty="0"/>
           </a:p>
@@ -28825,7 +29099,7 @@
           <a:p>
             <a:fld id="{BAD07360-8F9C-4FF8-B753-12BB54489DC8}" type="datetime1">
               <a:rPr lang="de-DE" noProof="0" smtClean="0"/>
-              <a:t>29.10.19</a:t>
+              <a:t>25.11.2019</a:t>
             </a:fld>
             <a:endParaRPr lang="de-DE" noProof="0" dirty="0"/>
           </a:p>
@@ -29636,7 +29910,7 @@
           <a:p>
             <a:fld id="{BAD07360-8F9C-4FF8-B753-12BB54489DC8}" type="datetime1">
               <a:rPr lang="de-DE" noProof="0" smtClean="0"/>
-              <a:t>29.10.19</a:t>
+              <a:t>25.11.2019</a:t>
             </a:fld>
             <a:endParaRPr lang="de-DE" noProof="0" dirty="0"/>
           </a:p>
@@ -30225,7 +30499,7 @@
           <a:p>
             <a:fld id="{F84828BB-7B4A-43F5-823E-CE2F139C8F04}" type="datetime1">
               <a:rPr lang="de-DE" noProof="0" smtClean="0"/>
-              <a:t>29.10.19</a:t>
+              <a:t>25.11.2019</a:t>
             </a:fld>
             <a:endParaRPr lang="de-DE" noProof="0" dirty="0"/>
           </a:p>
@@ -30937,7 +31211,7 @@
           <a:p>
             <a:fld id="{BAD07360-8F9C-4FF8-B753-12BB54489DC8}" type="datetime1">
               <a:rPr lang="de-DE" noProof="0" smtClean="0"/>
-              <a:t>29.10.19</a:t>
+              <a:t>25.11.2019</a:t>
             </a:fld>
             <a:endParaRPr lang="de-DE" noProof="0" dirty="0"/>
           </a:p>
@@ -31646,7 +31920,7 @@
           <a:p>
             <a:fld id="{DDA146EC-6F84-4175-AEE8-BACFBC2394F6}" type="datetime1">
               <a:rPr lang="de-DE" noProof="0" smtClean="0"/>
-              <a:t>29.10.19</a:t>
+              <a:t>25.11.2019</a:t>
             </a:fld>
             <a:endParaRPr lang="de-DE" noProof="0" dirty="0"/>
           </a:p>
@@ -32448,7 +32722,7 @@
           <a:p>
             <a:fld id="{DDA146EC-6F84-4175-AEE8-BACFBC2394F6}" type="datetime1">
               <a:rPr lang="de-DE" noProof="0" smtClean="0"/>
-              <a:t>29.10.19</a:t>
+              <a:t>25.11.2019</a:t>
             </a:fld>
             <a:endParaRPr lang="de-DE" noProof="0" dirty="0"/>
           </a:p>
@@ -32994,7 +33268,7 @@
           <a:p>
             <a:fld id="{DDA146EC-6F84-4175-AEE8-BACFBC2394F6}" type="datetime1">
               <a:rPr lang="de-DE" noProof="0" smtClean="0"/>
-              <a:t>29.10.19</a:t>
+              <a:t>25.11.2019</a:t>
             </a:fld>
             <a:endParaRPr lang="de-DE" noProof="0" dirty="0"/>
           </a:p>
@@ -33499,7 +33773,7 @@
           <a:p>
             <a:fld id="{BAD07360-8F9C-4FF8-B753-12BB54489DC8}" type="datetime1">
               <a:rPr lang="de-DE" noProof="0" smtClean="0"/>
-              <a:t>29.10.19</a:t>
+              <a:t>25.11.2019</a:t>
             </a:fld>
             <a:endParaRPr lang="de-DE" noProof="0" dirty="0"/>
           </a:p>
@@ -35112,7 +35386,7 @@
             <a:fld id="{BFDAD13F-B150-48FA-9084-D9E756CCCB07}" type="datetime1">
               <a:rPr lang="de-DE" smtClean="0"/>
               <a:pPr/>
-              <a:t>29.10.19</a:t>
+              <a:t>25.11.2019</a:t>
             </a:fld>
             <a:endParaRPr lang="de-DE" dirty="0"/>
           </a:p>
@@ -37739,7 +38013,7 @@
             <a:fld id="{7FC88BA9-6F9E-4215-AE89-45AC6BCA1B0E}" type="datetime1">
               <a:rPr lang="de-DE" smtClean="0"/>
               <a:pPr/>
-              <a:t>29.10.19</a:t>
+              <a:t>25.11.2019</a:t>
             </a:fld>
             <a:endParaRPr lang="de-DE" dirty="0"/>
           </a:p>
@@ -38092,7 +38366,7 @@
           <a:p>
             <a:fld id="{BFDAD13F-B150-48FA-9084-D9E756CCCB07}" type="datetime1">
               <a:rPr lang="de-DE" noProof="0" smtClean="0"/>
-              <a:t>29.10.19</a:t>
+              <a:t>25.11.2019</a:t>
             </a:fld>
             <a:endParaRPr lang="de-DE" noProof="0" dirty="0"/>
           </a:p>
@@ -39279,7 +39553,7 @@
           <p:cNvPr id="2" name="Titel 1">
             <a:extLst>
               <a:ext uri="{FF2B5EF4-FFF2-40B4-BE49-F238E27FC236}">
-                <a16:creationId xmlns:a16="http://schemas.microsoft.com/office/drawing/2014/main" id="{9ABFDAD6-C0E1-8141-B758-0212F3A14EF0}"/>
+                <a16:creationId xmlns:a16="http://schemas.microsoft.com/office/drawing/2014/main" id="{7630BFA5-D5C1-5841-B9FB-5851961ACD75}"/>
               </a:ext>
             </a:extLst>
           </p:cNvPr>
@@ -39297,7 +39571,7 @@
           <a:p>
             <a:r>
               <a:rPr lang="de-DE" dirty="0"/>
-              <a:t>Beispielanwendung</a:t>
+              <a:t>Frameworks</a:t>
             </a:r>
           </a:p>
         </p:txBody>
@@ -39307,7 +39581,7 @@
           <p:cNvPr id="3" name="Textplatzhalter 2">
             <a:extLst>
               <a:ext uri="{FF2B5EF4-FFF2-40B4-BE49-F238E27FC236}">
-                <a16:creationId xmlns:a16="http://schemas.microsoft.com/office/drawing/2014/main" id="{7B72EB04-8F2B-9649-8BCA-10A8855FA9DF}"/>
+                <a16:creationId xmlns:a16="http://schemas.microsoft.com/office/drawing/2014/main" id="{E13B0A18-2C1A-A14A-AA7E-EE9B740659E3}"/>
               </a:ext>
             </a:extLst>
           </p:cNvPr>
@@ -39325,15 +39599,7 @@
           <a:p>
             <a:r>
               <a:rPr lang="de-DE" dirty="0" err="1"/>
-              <a:t>Avoid</a:t>
-            </a:r>
-            <a:r>
-              <a:rPr lang="de-DE" dirty="0"/>
-              <a:t> </a:t>
-            </a:r>
-            <a:r>
-              <a:rPr lang="de-DE" dirty="0" err="1"/>
-              <a:t>Complexity</a:t>
+              <a:t>Selenium</a:t>
             </a:r>
             <a:endParaRPr lang="de-DE" dirty="0"/>
           </a:p>
@@ -39344,7 +39610,7 @@
           <p:cNvPr id="4" name="Textplatzhalter 3">
             <a:extLst>
               <a:ext uri="{FF2B5EF4-FFF2-40B4-BE49-F238E27FC236}">
-                <a16:creationId xmlns:a16="http://schemas.microsoft.com/office/drawing/2014/main" id="{6AF86A2C-1A98-B740-A6C7-96733375689D}"/>
+                <a16:creationId xmlns:a16="http://schemas.microsoft.com/office/drawing/2014/main" id="{F158517A-3EDC-BC45-84B7-468D446159A8}"/>
               </a:ext>
             </a:extLst>
           </p:cNvPr>
@@ -39369,7 +39635,7 @@
           <p:cNvPr id="5" name="Inhaltsplatzhalter 4">
             <a:extLst>
               <a:ext uri="{FF2B5EF4-FFF2-40B4-BE49-F238E27FC236}">
-                <a16:creationId xmlns:a16="http://schemas.microsoft.com/office/drawing/2014/main" id="{AEA18834-89EA-704B-A9D5-6D5196539E75}"/>
+                <a16:creationId xmlns:a16="http://schemas.microsoft.com/office/drawing/2014/main" id="{A01AC294-80A2-C245-9A1C-2F9DB3418C93}"/>
               </a:ext>
             </a:extLst>
           </p:cNvPr>
@@ -39380,34 +39646,33 @@
             <p:ph sz="half" idx="14"/>
           </p:nvPr>
         </p:nvSpPr>
-        <p:spPr/>
+        <p:spPr>
+          <a:xfrm>
+            <a:off x="756000" y="1512000"/>
+            <a:ext cx="11037600" cy="4298400"/>
+          </a:xfrm>
+        </p:spPr>
         <p:txBody>
           <a:bodyPr/>
           <a:lstStyle/>
           <a:p>
             <a:r>
               <a:rPr lang="de-DE" dirty="0"/>
-              <a:t>Simple Applikation</a:t>
-            </a:r>
-          </a:p>
-          <a:p>
-            <a:pPr lvl="1"/>
+              <a:t>Automatisierung von Browsern</a:t>
+            </a:r>
+          </a:p>
+          <a:p>
             <a:r>
               <a:rPr lang="de-DE" dirty="0"/>
-              <a:t>Eingabe und Anzeige Name</a:t>
-            </a:r>
-          </a:p>
-          <a:p>
-            <a:pPr lvl="1"/>
+              <a:t>Page-</a:t>
+            </a:r>
+            <a:r>
+              <a:rPr lang="de-DE" dirty="0" err="1"/>
+              <a:t>Object</a:t>
+            </a:r>
             <a:r>
               <a:rPr lang="de-DE" dirty="0"/>
-              <a:t>Berechnung einer Summe aus bis zu 3 Summanden</a:t>
-            </a:r>
-          </a:p>
-          <a:p>
-            <a:r>
-              <a:rPr lang="de-DE" dirty="0"/>
-              <a:t>Live Demo</a:t>
+              <a:t>-Pattern</a:t>
             </a:r>
           </a:p>
         </p:txBody>
@@ -39417,7 +39682,7 @@
           <p:cNvPr id="6" name="Fußzeilenplatzhalter 5">
             <a:extLst>
               <a:ext uri="{FF2B5EF4-FFF2-40B4-BE49-F238E27FC236}">
-                <a16:creationId xmlns:a16="http://schemas.microsoft.com/office/drawing/2014/main" id="{41C46F3B-E446-4544-8A96-29A3DE017D2F}"/>
+                <a16:creationId xmlns:a16="http://schemas.microsoft.com/office/drawing/2014/main" id="{C6168411-E865-6D49-839B-2960823AEA56}"/>
               </a:ext>
             </a:extLst>
           </p:cNvPr>
@@ -39457,7 +39722,7 @@
           <p:cNvPr id="7" name="Datumsplatzhalter 6">
             <a:extLst>
               <a:ext uri="{FF2B5EF4-FFF2-40B4-BE49-F238E27FC236}">
-                <a16:creationId xmlns:a16="http://schemas.microsoft.com/office/drawing/2014/main" id="{9B585C95-7521-D34A-8571-90376AC48DA7}"/>
+                <a16:creationId xmlns:a16="http://schemas.microsoft.com/office/drawing/2014/main" id="{9FAA6259-8E0C-5346-84AF-BD6FDD591C1B}"/>
               </a:ext>
             </a:extLst>
           </p:cNvPr>
@@ -39475,7 +39740,7 @@
           <a:p>
             <a:fld id="{154C7814-F218-4D9E-8E58-25588F0986B1}" type="datetime1">
               <a:rPr lang="de-DE" noProof="0" smtClean="0"/>
-              <a:t>29.10.19</a:t>
+              <a:t>25.11.2019</a:t>
             </a:fld>
             <a:endParaRPr lang="de-DE" noProof="0" dirty="0"/>
           </a:p>
@@ -39486,7 +39751,7 @@
           <p:cNvPr id="8" name="Foliennummernplatzhalter 7">
             <a:extLst>
               <a:ext uri="{FF2B5EF4-FFF2-40B4-BE49-F238E27FC236}">
-                <a16:creationId xmlns:a16="http://schemas.microsoft.com/office/drawing/2014/main" id="{6C9469C1-DF6E-E543-BE43-B68C9496F691}"/>
+                <a16:creationId xmlns:a16="http://schemas.microsoft.com/office/drawing/2014/main" id="{02FFAC50-D076-404C-8ED2-57CF0978543C}"/>
               </a:ext>
             </a:extLst>
           </p:cNvPr>
@@ -39511,10 +39776,38 @@
           </a:p>
         </p:txBody>
       </p:sp>
+      <p:graphicFrame>
+        <p:nvGraphicFramePr>
+          <p:cNvPr id="10" name="Diagramm 9">
+            <a:extLst>
+              <a:ext uri="{FF2B5EF4-FFF2-40B4-BE49-F238E27FC236}">
+                <a16:creationId xmlns:a16="http://schemas.microsoft.com/office/drawing/2014/main" id="{5B964A70-728D-E14C-BB7E-9EDA7EC110B1}"/>
+              </a:ext>
+            </a:extLst>
+          </p:cNvPr>
+          <p:cNvGraphicFramePr/>
+          <p:nvPr>
+            <p:extLst>
+              <p:ext uri="{D42A27DB-BD31-4B8C-83A1-F6EECF244321}">
+                <p14:modId xmlns:p14="http://schemas.microsoft.com/office/powerpoint/2010/main" val="4253762703"/>
+              </p:ext>
+            </p:extLst>
+          </p:nvPr>
+        </p:nvGraphicFramePr>
+        <p:xfrm>
+          <a:off x="895792" y="2456762"/>
+          <a:ext cx="10398827" cy="3272010"/>
+        </p:xfrm>
+        <a:graphic>
+          <a:graphicData uri="http://schemas.openxmlformats.org/drawingml/2006/diagram">
+            <dgm:relIds xmlns:dgm="http://schemas.openxmlformats.org/drawingml/2006/diagram" xmlns:r="http://schemas.openxmlformats.org/officeDocument/2006/relationships" r:dm="rId2" r:lo="rId3" r:qs="rId4" r:cs="rId5"/>
+          </a:graphicData>
+        </a:graphic>
+      </p:graphicFrame>
     </p:spTree>
     <p:extLst>
       <p:ext uri="{BB962C8B-B14F-4D97-AF65-F5344CB8AC3E}">
-        <p14:creationId xmlns:p14="http://schemas.microsoft.com/office/powerpoint/2010/main" val="2322926629"/>
+        <p14:creationId xmlns:p14="http://schemas.microsoft.com/office/powerpoint/2010/main" val="1810371097"/>
       </p:ext>
     </p:extLst>
   </p:cSld>
@@ -39558,7 +39851,7 @@
           <p:cNvPr id="9" name="Titel 8">
             <a:extLst>
               <a:ext uri="{FF2B5EF4-FFF2-40B4-BE49-F238E27FC236}">
-                <a16:creationId xmlns:a16="http://schemas.microsoft.com/office/drawing/2014/main" id="{1F6BE20F-A64A-F140-A8CA-A23DF3164E9E}"/>
+                <a16:creationId xmlns:a16="http://schemas.microsoft.com/office/drawing/2014/main" id="{48B8340E-24BB-F94C-A724-801E6666D3DD}"/>
               </a:ext>
             </a:extLst>
           </p:cNvPr>
@@ -39575,12 +39868,8 @@
           <a:lstStyle/>
           <a:p>
             <a:r>
-              <a:rPr lang="de-DE" dirty="0" err="1"/>
-              <a:t>Advanced</a:t>
-            </a:r>
-            <a:r>
               <a:rPr lang="de-DE" dirty="0"/>
-              <a:t> BDD</a:t>
+              <a:t>Beispielanwendung</a:t>
             </a:r>
           </a:p>
         </p:txBody>
@@ -39590,7 +39879,7 @@
           <p:cNvPr id="11" name="Textplatzhalter 10">
             <a:extLst>
               <a:ext uri="{FF2B5EF4-FFF2-40B4-BE49-F238E27FC236}">
-                <a16:creationId xmlns:a16="http://schemas.microsoft.com/office/drawing/2014/main" id="{1A040727-61CB-4B4D-9D15-2AE8DA9624C9}"/>
+                <a16:creationId xmlns:a16="http://schemas.microsoft.com/office/drawing/2014/main" id="{9F260F2E-84AC-AA42-B61C-0AC43FA79A0C}"/>
               </a:ext>
             </a:extLst>
           </p:cNvPr>
@@ -39615,7 +39904,7 @@
           <p:cNvPr id="10" name="Textplatzhalter 9">
             <a:extLst>
               <a:ext uri="{FF2B5EF4-FFF2-40B4-BE49-F238E27FC236}">
-                <a16:creationId xmlns:a16="http://schemas.microsoft.com/office/drawing/2014/main" id="{BD7FB345-8BDE-854E-9C69-804A13212A9B}"/>
+                <a16:creationId xmlns:a16="http://schemas.microsoft.com/office/drawing/2014/main" id="{F28D25E4-D47B-A244-94E1-EB61CD9566E5}"/>
               </a:ext>
             </a:extLst>
           </p:cNvPr>
@@ -39633,7 +39922,7 @@
           <a:p>
             <a:r>
               <a:rPr lang="de-DE" dirty="0"/>
-              <a:t>4.</a:t>
+              <a:t>3.</a:t>
             </a:r>
           </a:p>
         </p:txBody>
@@ -39643,7 +39932,7 @@
           <p:cNvPr id="12" name="Textplatzhalter 11">
             <a:extLst>
               <a:ext uri="{FF2B5EF4-FFF2-40B4-BE49-F238E27FC236}">
-                <a16:creationId xmlns:a16="http://schemas.microsoft.com/office/drawing/2014/main" id="{3F7886E6-BE3D-9B44-8220-FE114EB40693}"/>
+                <a16:creationId xmlns:a16="http://schemas.microsoft.com/office/drawing/2014/main" id="{47F875E8-011E-5F4F-927C-2594AB18C1B9}"/>
               </a:ext>
             </a:extLst>
           </p:cNvPr>
@@ -39668,7 +39957,7 @@
           <p:cNvPr id="6" name="Fußzeilenplatzhalter 5">
             <a:extLst>
               <a:ext uri="{FF2B5EF4-FFF2-40B4-BE49-F238E27FC236}">
-                <a16:creationId xmlns:a16="http://schemas.microsoft.com/office/drawing/2014/main" id="{414F27E5-0176-7344-B2EC-BCF406769CDF}"/>
+                <a16:creationId xmlns:a16="http://schemas.microsoft.com/office/drawing/2014/main" id="{78BA0521-E38C-C74B-94DE-1E59B74FC0AB}"/>
               </a:ext>
             </a:extLst>
           </p:cNvPr>
@@ -39713,7 +40002,7 @@
           <p:cNvPr id="7" name="Datumsplatzhalter 6">
             <a:extLst>
               <a:ext uri="{FF2B5EF4-FFF2-40B4-BE49-F238E27FC236}">
-                <a16:creationId xmlns:a16="http://schemas.microsoft.com/office/drawing/2014/main" id="{957F495B-25E3-9A43-9496-1F7F486001DB}"/>
+                <a16:creationId xmlns:a16="http://schemas.microsoft.com/office/drawing/2014/main" id="{B436E0FD-E05A-A84C-9957-E5B7C6399E96}"/>
               </a:ext>
             </a:extLst>
           </p:cNvPr>
@@ -39736,7 +40025,7 @@
           <a:p>
             <a:fld id="{154C7814-F218-4D9E-8E58-25588F0986B1}" type="datetime1">
               <a:rPr lang="de-DE" noProof="0" smtClean="0"/>
-              <a:t>29.10.19</a:t>
+              <a:t>25.11.2019</a:t>
             </a:fld>
             <a:endParaRPr lang="de-DE" noProof="0" dirty="0"/>
           </a:p>
@@ -39747,7 +40036,7 @@
           <p:cNvPr id="8" name="Foliennummernplatzhalter 7">
             <a:extLst>
               <a:ext uri="{FF2B5EF4-FFF2-40B4-BE49-F238E27FC236}">
-                <a16:creationId xmlns:a16="http://schemas.microsoft.com/office/drawing/2014/main" id="{AE8B5784-6656-BE41-A9AD-318FC83BB4C4}"/>
+                <a16:creationId xmlns:a16="http://schemas.microsoft.com/office/drawing/2014/main" id="{1B107D7B-A952-CC4A-80E8-151AB98DCA3E}"/>
               </a:ext>
             </a:extLst>
           </p:cNvPr>
@@ -39780,7 +40069,7 @@
     </p:spTree>
     <p:extLst>
       <p:ext uri="{BB962C8B-B14F-4D97-AF65-F5344CB8AC3E}">
-        <p14:creationId xmlns:p14="http://schemas.microsoft.com/office/powerpoint/2010/main" val="1593519667"/>
+        <p14:creationId xmlns:p14="http://schemas.microsoft.com/office/powerpoint/2010/main" val="514579875"/>
       </p:ext>
     </p:extLst>
   </p:cSld>
@@ -39821,6 +40110,551 @@
       </p:grpSpPr>
       <p:sp>
         <p:nvSpPr>
+          <p:cNvPr id="2" name="Titel 1">
+            <a:extLst>
+              <a:ext uri="{FF2B5EF4-FFF2-40B4-BE49-F238E27FC236}">
+                <a16:creationId xmlns:a16="http://schemas.microsoft.com/office/drawing/2014/main" id="{9ABFDAD6-C0E1-8141-B758-0212F3A14EF0}"/>
+              </a:ext>
+            </a:extLst>
+          </p:cNvPr>
+          <p:cNvSpPr>
+            <a:spLocks noGrp="1"/>
+          </p:cNvSpPr>
+          <p:nvPr>
+            <p:ph type="title"/>
+          </p:nvPr>
+        </p:nvSpPr>
+        <p:spPr/>
+        <p:txBody>
+          <a:bodyPr/>
+          <a:lstStyle/>
+          <a:p>
+            <a:r>
+              <a:rPr lang="de-DE" dirty="0"/>
+              <a:t>Beispielanwendung</a:t>
+            </a:r>
+          </a:p>
+        </p:txBody>
+      </p:sp>
+      <p:sp>
+        <p:nvSpPr>
+          <p:cNvPr id="3" name="Textplatzhalter 2">
+            <a:extLst>
+              <a:ext uri="{FF2B5EF4-FFF2-40B4-BE49-F238E27FC236}">
+                <a16:creationId xmlns:a16="http://schemas.microsoft.com/office/drawing/2014/main" id="{7B72EB04-8F2B-9649-8BCA-10A8855FA9DF}"/>
+              </a:ext>
+            </a:extLst>
+          </p:cNvPr>
+          <p:cNvSpPr>
+            <a:spLocks noGrp="1"/>
+          </p:cNvSpPr>
+          <p:nvPr>
+            <p:ph type="body" sz="quarter" idx="13"/>
+          </p:nvPr>
+        </p:nvSpPr>
+        <p:spPr/>
+        <p:txBody>
+          <a:bodyPr/>
+          <a:lstStyle/>
+          <a:p>
+            <a:r>
+              <a:rPr lang="de-DE" dirty="0" err="1"/>
+              <a:t>Avoid</a:t>
+            </a:r>
+            <a:r>
+              <a:rPr lang="de-DE" dirty="0"/>
+              <a:t> </a:t>
+            </a:r>
+            <a:r>
+              <a:rPr lang="de-DE" dirty="0" err="1"/>
+              <a:t>Complexity</a:t>
+            </a:r>
+            <a:endParaRPr lang="de-DE" dirty="0"/>
+          </a:p>
+        </p:txBody>
+      </p:sp>
+      <p:sp>
+        <p:nvSpPr>
+          <p:cNvPr id="4" name="Textplatzhalter 3">
+            <a:extLst>
+              <a:ext uri="{FF2B5EF4-FFF2-40B4-BE49-F238E27FC236}">
+                <a16:creationId xmlns:a16="http://schemas.microsoft.com/office/drawing/2014/main" id="{6AF86A2C-1A98-B740-A6C7-96733375689D}"/>
+              </a:ext>
+            </a:extLst>
+          </p:cNvPr>
+          <p:cNvSpPr>
+            <a:spLocks noGrp="1"/>
+          </p:cNvSpPr>
+          <p:nvPr>
+            <p:ph type="body" sz="quarter" idx="22"/>
+          </p:nvPr>
+        </p:nvSpPr>
+        <p:spPr/>
+        <p:txBody>
+          <a:bodyPr/>
+          <a:lstStyle/>
+          <a:p>
+            <a:endParaRPr lang="de-DE"/>
+          </a:p>
+        </p:txBody>
+      </p:sp>
+      <p:sp>
+        <p:nvSpPr>
+          <p:cNvPr id="5" name="Inhaltsplatzhalter 4">
+            <a:extLst>
+              <a:ext uri="{FF2B5EF4-FFF2-40B4-BE49-F238E27FC236}">
+                <a16:creationId xmlns:a16="http://schemas.microsoft.com/office/drawing/2014/main" id="{AEA18834-89EA-704B-A9D5-6D5196539E75}"/>
+              </a:ext>
+            </a:extLst>
+          </p:cNvPr>
+          <p:cNvSpPr>
+            <a:spLocks noGrp="1"/>
+          </p:cNvSpPr>
+          <p:nvPr>
+            <p:ph sz="half" idx="14"/>
+          </p:nvPr>
+        </p:nvSpPr>
+        <p:spPr/>
+        <p:txBody>
+          <a:bodyPr/>
+          <a:lstStyle/>
+          <a:p>
+            <a:r>
+              <a:rPr lang="de-DE" dirty="0"/>
+              <a:t>Simple Applikation</a:t>
+            </a:r>
+          </a:p>
+          <a:p>
+            <a:pPr lvl="1"/>
+            <a:r>
+              <a:rPr lang="de-DE" dirty="0"/>
+              <a:t>Eingabe und Anzeige Name</a:t>
+            </a:r>
+          </a:p>
+          <a:p>
+            <a:pPr lvl="1"/>
+            <a:r>
+              <a:rPr lang="de-DE" dirty="0"/>
+              <a:t>Berechnung einer Summe aus bis zu 3 Summanden</a:t>
+            </a:r>
+          </a:p>
+          <a:p>
+            <a:r>
+              <a:rPr lang="de-DE" dirty="0"/>
+              <a:t>Live Demo</a:t>
+            </a:r>
+          </a:p>
+        </p:txBody>
+      </p:sp>
+      <p:sp>
+        <p:nvSpPr>
+          <p:cNvPr id="6" name="Fußzeilenplatzhalter 5">
+            <a:extLst>
+              <a:ext uri="{FF2B5EF4-FFF2-40B4-BE49-F238E27FC236}">
+                <a16:creationId xmlns:a16="http://schemas.microsoft.com/office/drawing/2014/main" id="{41C46F3B-E446-4544-8A96-29A3DE017D2F}"/>
+              </a:ext>
+            </a:extLst>
+          </p:cNvPr>
+          <p:cNvSpPr>
+            <a:spLocks noGrp="1"/>
+          </p:cNvSpPr>
+          <p:nvPr>
+            <p:ph type="ftr" sz="quarter" idx="11"/>
+          </p:nvPr>
+        </p:nvSpPr>
+        <p:spPr/>
+        <p:txBody>
+          <a:bodyPr/>
+          <a:lstStyle/>
+          <a:p>
+            <a:r>
+              <a:rPr lang="de-DE" dirty="0" err="1"/>
+              <a:t>Advanced</a:t>
+            </a:r>
+            <a:r>
+              <a:rPr lang="de-DE" dirty="0"/>
+              <a:t> BDD / Maik Wagner / © </a:t>
+            </a:r>
+            <a:r>
+              <a:rPr lang="de-DE" dirty="0" err="1"/>
+              <a:t>Tallence</a:t>
+            </a:r>
+            <a:r>
+              <a:rPr lang="de-DE" dirty="0"/>
+              <a:t> AG</a:t>
+            </a:r>
+          </a:p>
+        </p:txBody>
+      </p:sp>
+      <p:sp>
+        <p:nvSpPr>
+          <p:cNvPr id="7" name="Datumsplatzhalter 6">
+            <a:extLst>
+              <a:ext uri="{FF2B5EF4-FFF2-40B4-BE49-F238E27FC236}">
+                <a16:creationId xmlns:a16="http://schemas.microsoft.com/office/drawing/2014/main" id="{9B585C95-7521-D34A-8571-90376AC48DA7}"/>
+              </a:ext>
+            </a:extLst>
+          </p:cNvPr>
+          <p:cNvSpPr>
+            <a:spLocks noGrp="1"/>
+          </p:cNvSpPr>
+          <p:nvPr>
+            <p:ph type="dt" sz="half" idx="10"/>
+          </p:nvPr>
+        </p:nvSpPr>
+        <p:spPr/>
+        <p:txBody>
+          <a:bodyPr/>
+          <a:lstStyle/>
+          <a:p>
+            <a:fld id="{154C7814-F218-4D9E-8E58-25588F0986B1}" type="datetime1">
+              <a:rPr lang="de-DE" noProof="0" smtClean="0"/>
+              <a:t>25.11.2019</a:t>
+            </a:fld>
+            <a:endParaRPr lang="de-DE" noProof="0" dirty="0"/>
+          </a:p>
+        </p:txBody>
+      </p:sp>
+      <p:sp>
+        <p:nvSpPr>
+          <p:cNvPr id="8" name="Foliennummernplatzhalter 7">
+            <a:extLst>
+              <a:ext uri="{FF2B5EF4-FFF2-40B4-BE49-F238E27FC236}">
+                <a16:creationId xmlns:a16="http://schemas.microsoft.com/office/drawing/2014/main" id="{6C9469C1-DF6E-E543-BE43-B68C9496F691}"/>
+              </a:ext>
+            </a:extLst>
+          </p:cNvPr>
+          <p:cNvSpPr>
+            <a:spLocks noGrp="1"/>
+          </p:cNvSpPr>
+          <p:nvPr>
+            <p:ph type="sldNum" sz="quarter" idx="12"/>
+          </p:nvPr>
+        </p:nvSpPr>
+        <p:spPr/>
+        <p:txBody>
+          <a:bodyPr/>
+          <a:lstStyle/>
+          <a:p>
+            <a:fld id="{02CEFE82-39F2-4F47-8A0C-D5AB3496FA5C}" type="slidenum">
+              <a:rPr lang="de-DE" noProof="0" smtClean="0"/>
+              <a:pPr/>
+              <a:t>12</a:t>
+            </a:fld>
+            <a:endParaRPr lang="de-DE" noProof="0" dirty="0"/>
+          </a:p>
+        </p:txBody>
+      </p:sp>
+    </p:spTree>
+    <p:extLst>
+      <p:ext uri="{BB962C8B-B14F-4D97-AF65-F5344CB8AC3E}">
+        <p14:creationId xmlns:p14="http://schemas.microsoft.com/office/powerpoint/2010/main" val="2322926629"/>
+      </p:ext>
+    </p:extLst>
+  </p:cSld>
+  <p:clrMapOvr>
+    <a:masterClrMapping/>
+  </p:clrMapOvr>
+  <mc:AlternateContent xmlns:mc="http://schemas.openxmlformats.org/markup-compatibility/2006" xmlns:p14="http://schemas.microsoft.com/office/powerpoint/2010/main">
+    <mc:Choice Requires="p14">
+      <p:transition spd="med" p14:dur="700">
+        <p:fade/>
+      </p:transition>
+    </mc:Choice>
+    <mc:Fallback xmlns="">
+      <p:transition spd="med">
+        <p:fade/>
+      </p:transition>
+    </mc:Fallback>
+  </mc:AlternateContent>
+</p:sld>
+</file>
+
+<file path=ppt/slides/slide13.xml><?xml version="1.0" encoding="utf-8"?>
+<p:sld xmlns:a="http://schemas.openxmlformats.org/drawingml/2006/main" xmlns:r="http://schemas.openxmlformats.org/officeDocument/2006/relationships" xmlns:p="http://schemas.openxmlformats.org/presentationml/2006/main">
+  <p:cSld>
+    <p:spTree>
+      <p:nvGrpSpPr>
+        <p:cNvPr id="1" name=""/>
+        <p:cNvGrpSpPr/>
+        <p:nvPr/>
+      </p:nvGrpSpPr>
+      <p:grpSpPr>
+        <a:xfrm>
+          <a:off x="0" y="0"/>
+          <a:ext cx="0" cy="0"/>
+          <a:chOff x="0" y="0"/>
+          <a:chExt cx="0" cy="0"/>
+        </a:xfrm>
+      </p:grpSpPr>
+      <p:sp>
+        <p:nvSpPr>
+          <p:cNvPr id="9" name="Titel 8">
+            <a:extLst>
+              <a:ext uri="{FF2B5EF4-FFF2-40B4-BE49-F238E27FC236}">
+                <a16:creationId xmlns:a16="http://schemas.microsoft.com/office/drawing/2014/main" id="{1F6BE20F-A64A-F140-A8CA-A23DF3164E9E}"/>
+              </a:ext>
+            </a:extLst>
+          </p:cNvPr>
+          <p:cNvSpPr>
+            <a:spLocks noGrp="1"/>
+          </p:cNvSpPr>
+          <p:nvPr>
+            <p:ph type="ctrTitle"/>
+          </p:nvPr>
+        </p:nvSpPr>
+        <p:spPr/>
+        <p:txBody>
+          <a:bodyPr/>
+          <a:lstStyle/>
+          <a:p>
+            <a:r>
+              <a:rPr lang="de-DE" dirty="0" err="1"/>
+              <a:t>Advanced</a:t>
+            </a:r>
+            <a:r>
+              <a:rPr lang="de-DE" dirty="0"/>
+              <a:t> BDD</a:t>
+            </a:r>
+          </a:p>
+        </p:txBody>
+      </p:sp>
+      <p:sp>
+        <p:nvSpPr>
+          <p:cNvPr id="11" name="Textplatzhalter 10">
+            <a:extLst>
+              <a:ext uri="{FF2B5EF4-FFF2-40B4-BE49-F238E27FC236}">
+                <a16:creationId xmlns:a16="http://schemas.microsoft.com/office/drawing/2014/main" id="{1A040727-61CB-4B4D-9D15-2AE8DA9624C9}"/>
+              </a:ext>
+            </a:extLst>
+          </p:cNvPr>
+          <p:cNvSpPr>
+            <a:spLocks noGrp="1"/>
+          </p:cNvSpPr>
+          <p:nvPr>
+            <p:ph type="body" sz="quarter" idx="14"/>
+          </p:nvPr>
+        </p:nvSpPr>
+        <p:spPr/>
+        <p:txBody>
+          <a:bodyPr/>
+          <a:lstStyle/>
+          <a:p>
+            <a:endParaRPr lang="de-DE"/>
+          </a:p>
+        </p:txBody>
+      </p:sp>
+      <p:sp>
+        <p:nvSpPr>
+          <p:cNvPr id="10" name="Textplatzhalter 9">
+            <a:extLst>
+              <a:ext uri="{FF2B5EF4-FFF2-40B4-BE49-F238E27FC236}">
+                <a16:creationId xmlns:a16="http://schemas.microsoft.com/office/drawing/2014/main" id="{BD7FB345-8BDE-854E-9C69-804A13212A9B}"/>
+              </a:ext>
+            </a:extLst>
+          </p:cNvPr>
+          <p:cNvSpPr>
+            <a:spLocks noGrp="1"/>
+          </p:cNvSpPr>
+          <p:nvPr>
+            <p:ph type="body" sz="quarter" idx="11"/>
+          </p:nvPr>
+        </p:nvSpPr>
+        <p:spPr/>
+        <p:txBody>
+          <a:bodyPr/>
+          <a:lstStyle/>
+          <a:p>
+            <a:r>
+              <a:rPr lang="de-DE" dirty="0"/>
+              <a:t>4.</a:t>
+            </a:r>
+          </a:p>
+        </p:txBody>
+      </p:sp>
+      <p:sp>
+        <p:nvSpPr>
+          <p:cNvPr id="12" name="Textplatzhalter 11">
+            <a:extLst>
+              <a:ext uri="{FF2B5EF4-FFF2-40B4-BE49-F238E27FC236}">
+                <a16:creationId xmlns:a16="http://schemas.microsoft.com/office/drawing/2014/main" id="{3F7886E6-BE3D-9B44-8220-FE114EB40693}"/>
+              </a:ext>
+            </a:extLst>
+          </p:cNvPr>
+          <p:cNvSpPr>
+            <a:spLocks noGrp="1"/>
+          </p:cNvSpPr>
+          <p:nvPr>
+            <p:ph type="body" sz="quarter" idx="87"/>
+          </p:nvPr>
+        </p:nvSpPr>
+        <p:spPr/>
+        <p:txBody>
+          <a:bodyPr/>
+          <a:lstStyle/>
+          <a:p>
+            <a:endParaRPr lang="de-DE"/>
+          </a:p>
+        </p:txBody>
+      </p:sp>
+      <p:sp>
+        <p:nvSpPr>
+          <p:cNvPr id="6" name="Fußzeilenplatzhalter 5">
+            <a:extLst>
+              <a:ext uri="{FF2B5EF4-FFF2-40B4-BE49-F238E27FC236}">
+                <a16:creationId xmlns:a16="http://schemas.microsoft.com/office/drawing/2014/main" id="{414F27E5-0176-7344-B2EC-BCF406769CDF}"/>
+              </a:ext>
+            </a:extLst>
+          </p:cNvPr>
+          <p:cNvSpPr>
+            <a:spLocks noGrp="1"/>
+          </p:cNvSpPr>
+          <p:nvPr>
+            <p:ph type="ftr" sz="quarter" idx="4294967295"/>
+          </p:nvPr>
+        </p:nvSpPr>
+        <p:spPr>
+          <a:xfrm>
+            <a:off x="0" y="6291263"/>
+            <a:ext cx="5556250" cy="360362"/>
+          </a:xfrm>
+        </p:spPr>
+        <p:txBody>
+          <a:bodyPr/>
+          <a:lstStyle/>
+          <a:p>
+            <a:r>
+              <a:rPr lang="de-DE" dirty="0" err="1"/>
+              <a:t>Advanced</a:t>
+            </a:r>
+            <a:r>
+              <a:rPr lang="de-DE" dirty="0"/>
+              <a:t> BDD / Maik Wagner / © </a:t>
+            </a:r>
+            <a:r>
+              <a:rPr lang="de-DE" dirty="0" err="1"/>
+              <a:t>Tallence</a:t>
+            </a:r>
+            <a:r>
+              <a:rPr lang="de-DE" dirty="0"/>
+              <a:t> AG</a:t>
+            </a:r>
+          </a:p>
+        </p:txBody>
+      </p:sp>
+      <p:sp>
+        <p:nvSpPr>
+          <p:cNvPr id="7" name="Datumsplatzhalter 6">
+            <a:extLst>
+              <a:ext uri="{FF2B5EF4-FFF2-40B4-BE49-F238E27FC236}">
+                <a16:creationId xmlns:a16="http://schemas.microsoft.com/office/drawing/2014/main" id="{957F495B-25E3-9A43-9496-1F7F486001DB}"/>
+              </a:ext>
+            </a:extLst>
+          </p:cNvPr>
+          <p:cNvSpPr>
+            <a:spLocks noGrp="1"/>
+          </p:cNvSpPr>
+          <p:nvPr>
+            <p:ph type="dt" sz="half" idx="4294967295"/>
+          </p:nvPr>
+        </p:nvSpPr>
+        <p:spPr>
+          <a:xfrm>
+            <a:off x="11501438" y="6291263"/>
+            <a:ext cx="688975" cy="360362"/>
+          </a:xfrm>
+        </p:spPr>
+        <p:txBody>
+          <a:bodyPr/>
+          <a:lstStyle/>
+          <a:p>
+            <a:fld id="{154C7814-F218-4D9E-8E58-25588F0986B1}" type="datetime1">
+              <a:rPr lang="de-DE" noProof="0" smtClean="0"/>
+              <a:t>25.11.2019</a:t>
+            </a:fld>
+            <a:endParaRPr lang="de-DE" noProof="0" dirty="0"/>
+          </a:p>
+        </p:txBody>
+      </p:sp>
+      <p:sp>
+        <p:nvSpPr>
+          <p:cNvPr id="8" name="Foliennummernplatzhalter 7">
+            <a:extLst>
+              <a:ext uri="{FF2B5EF4-FFF2-40B4-BE49-F238E27FC236}">
+                <a16:creationId xmlns:a16="http://schemas.microsoft.com/office/drawing/2014/main" id="{AE8B5784-6656-BE41-A9AD-318FC83BB4C4}"/>
+              </a:ext>
+            </a:extLst>
+          </p:cNvPr>
+          <p:cNvSpPr>
+            <a:spLocks noGrp="1"/>
+          </p:cNvSpPr>
+          <p:nvPr>
+            <p:ph type="sldNum" sz="quarter" idx="4294967295"/>
+          </p:nvPr>
+        </p:nvSpPr>
+        <p:spPr>
+          <a:xfrm>
+            <a:off x="11909425" y="6291263"/>
+            <a:ext cx="280988" cy="360362"/>
+          </a:xfrm>
+        </p:spPr>
+        <p:txBody>
+          <a:bodyPr/>
+          <a:lstStyle/>
+          <a:p>
+            <a:fld id="{02CEFE82-39F2-4F47-8A0C-D5AB3496FA5C}" type="slidenum">
+              <a:rPr lang="de-DE" noProof="0" smtClean="0"/>
+              <a:pPr/>
+              <a:t>13</a:t>
+            </a:fld>
+            <a:endParaRPr lang="de-DE" noProof="0" dirty="0"/>
+          </a:p>
+        </p:txBody>
+      </p:sp>
+    </p:spTree>
+    <p:extLst>
+      <p:ext uri="{BB962C8B-B14F-4D97-AF65-F5344CB8AC3E}">
+        <p14:creationId xmlns:p14="http://schemas.microsoft.com/office/powerpoint/2010/main" val="1593519667"/>
+      </p:ext>
+    </p:extLst>
+  </p:cSld>
+  <p:clrMapOvr>
+    <a:masterClrMapping/>
+  </p:clrMapOvr>
+  <mc:AlternateContent xmlns:mc="http://schemas.openxmlformats.org/markup-compatibility/2006" xmlns:p14="http://schemas.microsoft.com/office/powerpoint/2010/main">
+    <mc:Choice Requires="p14">
+      <p:transition spd="med" p14:dur="700">
+        <p:fade/>
+      </p:transition>
+    </mc:Choice>
+    <mc:Fallback xmlns="">
+      <p:transition spd="med">
+        <p:fade/>
+      </p:transition>
+    </mc:Fallback>
+  </mc:AlternateContent>
+</p:sld>
+</file>
+
+<file path=ppt/slides/slide14.xml><?xml version="1.0" encoding="utf-8"?>
+<p:sld xmlns:a="http://schemas.openxmlformats.org/drawingml/2006/main" xmlns:r="http://schemas.openxmlformats.org/officeDocument/2006/relationships" xmlns:p="http://schemas.openxmlformats.org/presentationml/2006/main">
+  <p:cSld>
+    <p:spTree>
+      <p:nvGrpSpPr>
+        <p:cNvPr id="1" name=""/>
+        <p:cNvGrpSpPr/>
+        <p:nvPr/>
+      </p:nvGrpSpPr>
+      <p:grpSpPr>
+        <a:xfrm>
+          <a:off x="0" y="0"/>
+          <a:ext cx="0" cy="0"/>
+          <a:chOff x="0" y="0"/>
+          <a:chExt cx="0" cy="0"/>
+        </a:xfrm>
+      </p:grpSpPr>
+      <p:sp>
+        <p:nvSpPr>
           <p:cNvPr id="10" name="Textplatzhalter 9">
             <a:extLst>
               <a:ext uri="{FF2B5EF4-FFF2-40B4-BE49-F238E27FC236}">
@@ -40284,7 +41118,7 @@
           <a:p>
             <a:fld id="{154C7814-F218-4D9E-8E58-25588F0986B1}" type="datetime1">
               <a:rPr lang="de-DE" noProof="0" smtClean="0"/>
-              <a:t>29.10.19</a:t>
+              <a:t>25.11.2019</a:t>
             </a:fld>
             <a:endParaRPr lang="de-DE" noProof="0" dirty="0"/>
           </a:p>
@@ -40319,7 +41153,7 @@
             <a:fld id="{02CEFE82-39F2-4F47-8A0C-D5AB3496FA5C}" type="slidenum">
               <a:rPr lang="de-DE" noProof="0" smtClean="0"/>
               <a:pPr/>
-              <a:t>12</a:t>
+              <a:t>14</a:t>
             </a:fld>
             <a:endParaRPr lang="de-DE" noProof="0" dirty="0"/>
           </a:p>
@@ -41220,7 +42054,7 @@
           <a:p>
             <a:fld id="{6FEC6909-2C01-40CF-9626-2CD40C8FE822}" type="datetime1">
               <a:rPr lang="de-DE" noProof="0" smtClean="0"/>
-              <a:t>29.10.19</a:t>
+              <a:t>25.11.2019</a:t>
             </a:fld>
             <a:endParaRPr lang="de-DE" noProof="0" dirty="0"/>
           </a:p>
@@ -41325,7 +42159,7 @@
           <a:p>
             <a:r>
               <a:rPr lang="de-DE" dirty="0"/>
-              <a:t>Einleitung</a:t>
+              <a:t>Vorstellung</a:t>
             </a:r>
           </a:p>
         </p:txBody>
@@ -41379,7 +42213,92 @@
           <a:bodyPr/>
           <a:lstStyle/>
           <a:p>
+            <a:r>
+              <a:rPr lang="de-DE" dirty="0"/>
+              <a:t>Studium Informatik - Hochschule Zittau/Görlitz (HSZG)</a:t>
+            </a:r>
+          </a:p>
+          <a:p>
+            <a:r>
+              <a:rPr lang="de-DE" dirty="0"/>
+              <a:t>Sun Certified Java </a:t>
+            </a:r>
+            <a:r>
+              <a:rPr lang="de-DE" dirty="0" err="1"/>
+              <a:t>Programmer</a:t>
+            </a:r>
             <a:endParaRPr lang="de-DE" dirty="0"/>
+          </a:p>
+          <a:p>
+            <a:r>
+              <a:rPr lang="de-DE" dirty="0"/>
+              <a:t>Stationen</a:t>
+            </a:r>
+          </a:p>
+          <a:p>
+            <a:pPr lvl="1"/>
+            <a:r>
+              <a:rPr lang="de-DE" dirty="0"/>
+              <a:t>Immobilienscout GmbH – Java Developer </a:t>
+            </a:r>
+          </a:p>
+          <a:p>
+            <a:pPr lvl="2"/>
+            <a:r>
+              <a:rPr lang="de-DE" dirty="0"/>
+              <a:t>Verantwortlich für Booking-Billing-Pricing</a:t>
+            </a:r>
+          </a:p>
+          <a:p>
+            <a:pPr lvl="1"/>
+            <a:r>
+              <a:rPr lang="de-DE" dirty="0"/>
+              <a:t>Private Sale GmbH – brands4friends – Java Developer</a:t>
+            </a:r>
+          </a:p>
+          <a:p>
+            <a:pPr lvl="2"/>
+            <a:r>
+              <a:rPr lang="de-DE" dirty="0"/>
+              <a:t>U.a. Optimierung der Performanz des Login-Prozesses, Einführung einer </a:t>
+            </a:r>
+            <a:r>
+              <a:rPr lang="de-DE" dirty="0" err="1"/>
+              <a:t>Recommendation</a:t>
+            </a:r>
+            <a:r>
+              <a:rPr lang="de-DE" dirty="0"/>
+              <a:t>-Engine </a:t>
+            </a:r>
+          </a:p>
+          <a:p>
+            <a:pPr lvl="1"/>
+            <a:r>
+              <a:rPr lang="de-DE" dirty="0"/>
+              <a:t>DSER GmbH – Senior Java Developer </a:t>
+            </a:r>
+          </a:p>
+          <a:p>
+            <a:pPr lvl="2"/>
+            <a:r>
+              <a:rPr lang="de-DE" dirty="0"/>
+              <a:t>Weiterentwicklung des Portfoliomanagement-Systems MUNIO</a:t>
+            </a:r>
+          </a:p>
+          <a:p>
+            <a:pPr lvl="2"/>
+            <a:r>
+              <a:rPr lang="de-DE" dirty="0"/>
+              <a:t>Entwicklung einer </a:t>
+            </a:r>
+            <a:r>
+              <a:rPr lang="de-DE" dirty="0" err="1"/>
+              <a:t>Robo</a:t>
+            </a:r>
+            <a:r>
+              <a:rPr lang="de-DE" dirty="0"/>
+              <a:t>-Advisory Plattform</a:t>
+            </a:r>
           </a:p>
         </p:txBody>
       </p:sp>
@@ -41400,7 +42319,7 @@
           </p:nvPr>
         </p:nvPicPr>
         <p:blipFill>
-          <a:blip r:embed="rId2"/>
+          <a:blip r:embed="rId3"/>
           <a:srcRect l="13251" r="13251"/>
           <a:stretch>
             <a:fillRect/>
@@ -41567,7 +42486,7 @@
           <a:p>
             <a:fld id="{6FEC6909-2C01-40CF-9626-2CD40C8FE822}" type="datetime1">
               <a:rPr lang="de-DE" noProof="0" smtClean="0"/>
-              <a:t>29.10.19</a:t>
+              <a:t>25.11.2019</a:t>
             </a:fld>
             <a:endParaRPr lang="de-DE" noProof="0" dirty="0"/>
           </a:p>
@@ -41667,8 +42586,20 @@
           <a:p>
             <a:r>
               <a:rPr lang="de-DE" dirty="0"/>
-              <a:t>Einleitung</a:t>
-            </a:r>
+              <a:t>BDD - </a:t>
+            </a:r>
+            <a:r>
+              <a:rPr lang="de-DE" dirty="0" err="1"/>
+              <a:t>Behaviour</a:t>
+            </a:r>
+            <a:r>
+              <a:rPr lang="de-DE" dirty="0"/>
+              <a:t>-Driven Development</a:t>
+            </a:r>
+            <a:br>
+              <a:rPr lang="de-DE" dirty="0"/>
+            </a:br>
+            <a:endParaRPr lang="de-DE" dirty="0"/>
           </a:p>
         </p:txBody>
       </p:sp>
@@ -41695,7 +42626,7 @@
           <a:p>
             <a:r>
               <a:rPr lang="de-DE" dirty="0"/>
-              <a:t>Themenüberblick</a:t>
+              <a:t>Einleitung</a:t>
             </a:r>
           </a:p>
         </p:txBody>
@@ -41741,39 +42672,58 @@
             <p:ph sz="half" idx="14"/>
           </p:nvPr>
         </p:nvSpPr>
-        <p:spPr/>
+        <p:spPr>
+          <a:xfrm>
+            <a:off x="756000" y="1512000"/>
+            <a:ext cx="7296179" cy="4298400"/>
+          </a:xfrm>
+        </p:spPr>
         <p:txBody>
           <a:bodyPr/>
           <a:lstStyle/>
           <a:p>
+            <a:pPr lvl="1"/>
+            <a:r>
+              <a:rPr lang="de-DE" b="1" dirty="0" err="1"/>
+              <a:t>Ubiquitous</a:t>
+            </a:r>
+            <a:r>
+              <a:rPr lang="de-DE" b="1" dirty="0"/>
+              <a:t> Language</a:t>
+            </a:r>
             <a:r>
               <a:rPr lang="de-DE" dirty="0"/>
-              <a:t>Was sind Software-Tests?</a:t>
+              <a:t> - Textuelle Beschreibung des Verhaltens der Software und von Softwareteilen durch Fallbeispiele</a:t>
             </a:r>
           </a:p>
           <a:p>
             <a:pPr lvl="1"/>
             <a:r>
               <a:rPr lang="de-DE" dirty="0"/>
-              <a:t>prüft und bewertet Software auf Erfüllung der für ihren Einsatz definierten Anforderungen</a:t>
-            </a:r>
-          </a:p>
-          <a:p>
+              <a:t>Automatisierung von Fallballbeispielen</a:t>
+            </a:r>
+          </a:p>
+          <a:p>
+            <a:pPr lvl="1"/>
             <a:r>
               <a:rPr lang="de-DE" dirty="0"/>
-              <a:t>Was ist BDD?</a:t>
+              <a:t>Stärkt Zusammenarbeit von Qualitätsmanagement - Business Analyse – Entwicklung</a:t>
             </a:r>
           </a:p>
           <a:p>
             <a:pPr lvl="1"/>
             <a:r>
-              <a:rPr lang="de-DE" dirty="0" err="1"/>
-              <a:t>Behaviour-Driven</a:t>
-            </a:r>
-            <a:r>
               <a:rPr lang="de-DE" dirty="0"/>
-              <a:t> Development</a:t>
-            </a:r>
+              <a:t>Setzt im Entwicklungsprozess am Anfang an</a:t>
+            </a:r>
+          </a:p>
+          <a:p>
+            <a:pPr lvl="1"/>
+            <a:endParaRPr lang="de-DE" dirty="0"/>
+          </a:p>
+          <a:p>
+            <a:pPr lvl="1"/>
+            <a:endParaRPr lang="de-DE" dirty="0"/>
           </a:p>
           <a:p>
             <a:endParaRPr lang="de-DE" dirty="0"/>
@@ -41843,7 +42793,7 @@
           <a:p>
             <a:fld id="{154C7814-F218-4D9E-8E58-25588F0986B1}" type="datetime1">
               <a:rPr lang="de-DE" noProof="0" smtClean="0"/>
-              <a:t>29.10.19</a:t>
+              <a:t>25.11.2019</a:t>
             </a:fld>
             <a:endParaRPr lang="de-DE" noProof="0" dirty="0"/>
           </a:p>
@@ -41901,7 +42851,7 @@
         </p:blipFill>
         <p:spPr>
           <a:xfrm>
-            <a:off x="7599362" y="2635400"/>
+            <a:off x="8259413" y="1741472"/>
             <a:ext cx="3175000" cy="3175000"/>
           </a:xfrm>
           <a:prstGeom prst="rect">
@@ -41953,6 +42903,1246 @@
       </p:grpSpPr>
       <p:sp>
         <p:nvSpPr>
+          <p:cNvPr id="2" name="Titel 1">
+            <a:extLst>
+              <a:ext uri="{FF2B5EF4-FFF2-40B4-BE49-F238E27FC236}">
+                <a16:creationId xmlns:a16="http://schemas.microsoft.com/office/drawing/2014/main" id="{896A6613-F3F0-5945-9BFC-BB4411304B7F}"/>
+              </a:ext>
+            </a:extLst>
+          </p:cNvPr>
+          <p:cNvSpPr>
+            <a:spLocks noGrp="1"/>
+          </p:cNvSpPr>
+          <p:nvPr>
+            <p:ph type="title"/>
+          </p:nvPr>
+        </p:nvSpPr>
+        <p:spPr/>
+        <p:txBody>
+          <a:bodyPr/>
+          <a:lstStyle/>
+          <a:p>
+            <a:r>
+              <a:rPr lang="de-DE" dirty="0"/>
+              <a:t>BDD - </a:t>
+            </a:r>
+            <a:r>
+              <a:rPr lang="de-DE" dirty="0" err="1"/>
+              <a:t>Behaviour</a:t>
+            </a:r>
+            <a:r>
+              <a:rPr lang="de-DE" dirty="0"/>
+              <a:t>-Driven Development</a:t>
+            </a:r>
+            <a:br>
+              <a:rPr lang="de-DE" dirty="0"/>
+            </a:br>
+            <a:endParaRPr lang="de-DE" dirty="0"/>
+          </a:p>
+        </p:txBody>
+      </p:sp>
+      <p:sp>
+        <p:nvSpPr>
+          <p:cNvPr id="3" name="Textplatzhalter 2">
+            <a:extLst>
+              <a:ext uri="{FF2B5EF4-FFF2-40B4-BE49-F238E27FC236}">
+                <a16:creationId xmlns:a16="http://schemas.microsoft.com/office/drawing/2014/main" id="{C2783B6D-2F09-8B41-94FE-416F35F0FEFD}"/>
+              </a:ext>
+            </a:extLst>
+          </p:cNvPr>
+          <p:cNvSpPr>
+            <a:spLocks noGrp="1"/>
+          </p:cNvSpPr>
+          <p:nvPr>
+            <p:ph type="body" sz="quarter" idx="13"/>
+          </p:nvPr>
+        </p:nvSpPr>
+        <p:spPr/>
+        <p:txBody>
+          <a:bodyPr/>
+          <a:lstStyle/>
+          <a:p>
+            <a:r>
+              <a:rPr lang="de-DE" dirty="0"/>
+              <a:t>Einleitung - Szenarios </a:t>
+            </a:r>
+          </a:p>
+        </p:txBody>
+      </p:sp>
+      <p:sp>
+        <p:nvSpPr>
+          <p:cNvPr id="4" name="Textplatzhalter 3">
+            <a:extLst>
+              <a:ext uri="{FF2B5EF4-FFF2-40B4-BE49-F238E27FC236}">
+                <a16:creationId xmlns:a16="http://schemas.microsoft.com/office/drawing/2014/main" id="{5DECD20D-115D-9347-AA3F-FF8E5B0AF70E}"/>
+              </a:ext>
+            </a:extLst>
+          </p:cNvPr>
+          <p:cNvSpPr>
+            <a:spLocks noGrp="1"/>
+          </p:cNvSpPr>
+          <p:nvPr>
+            <p:ph type="body" sz="quarter" idx="22"/>
+          </p:nvPr>
+        </p:nvSpPr>
+        <p:spPr/>
+        <p:txBody>
+          <a:bodyPr/>
+          <a:lstStyle/>
+          <a:p>
+            <a:endParaRPr lang="de-DE"/>
+          </a:p>
+        </p:txBody>
+      </p:sp>
+      <p:sp>
+        <p:nvSpPr>
+          <p:cNvPr id="5" name="Inhaltsplatzhalter 4">
+            <a:extLst>
+              <a:ext uri="{FF2B5EF4-FFF2-40B4-BE49-F238E27FC236}">
+                <a16:creationId xmlns:a16="http://schemas.microsoft.com/office/drawing/2014/main" id="{D295D297-BE66-D74A-8741-3B72EE2A0CD0}"/>
+              </a:ext>
+            </a:extLst>
+          </p:cNvPr>
+          <p:cNvSpPr>
+            <a:spLocks noGrp="1"/>
+          </p:cNvSpPr>
+          <p:nvPr>
+            <p:ph sz="half" idx="14"/>
+          </p:nvPr>
+        </p:nvSpPr>
+        <p:spPr>
+          <a:xfrm>
+            <a:off x="756000" y="1512000"/>
+            <a:ext cx="8872496" cy="507869"/>
+          </a:xfrm>
+        </p:spPr>
+        <p:txBody>
+          <a:bodyPr/>
+          <a:lstStyle/>
+          <a:p>
+            <a:r>
+              <a:rPr lang="de-DE" dirty="0"/>
+              <a:t>Szenarios – </a:t>
+            </a:r>
+            <a:r>
+              <a:rPr lang="de-DE" b="1" dirty="0"/>
+              <a:t>Gegeben-Wenn-Dann</a:t>
+            </a:r>
+            <a:r>
+              <a:rPr lang="de-DE" dirty="0"/>
+              <a:t> (Given-</a:t>
+            </a:r>
+            <a:r>
+              <a:rPr lang="de-DE" dirty="0" err="1"/>
+              <a:t>When</a:t>
+            </a:r>
+            <a:r>
+              <a:rPr lang="de-DE" dirty="0"/>
+              <a:t>-</a:t>
+            </a:r>
+            <a:r>
+              <a:rPr lang="de-DE" dirty="0" err="1"/>
+              <a:t>Then</a:t>
+            </a:r>
+            <a:r>
+              <a:rPr lang="de-DE" dirty="0"/>
+              <a:t>)</a:t>
+            </a:r>
+          </a:p>
+          <a:p>
+            <a:pPr lvl="1"/>
+            <a:endParaRPr lang="de-DE" dirty="0"/>
+          </a:p>
+          <a:p>
+            <a:pPr lvl="1"/>
+            <a:endParaRPr lang="de-DE" dirty="0"/>
+          </a:p>
+          <a:p>
+            <a:endParaRPr lang="de-DE" dirty="0"/>
+          </a:p>
+        </p:txBody>
+      </p:sp>
+      <p:sp>
+        <p:nvSpPr>
+          <p:cNvPr id="6" name="Fußzeilenplatzhalter 5">
+            <a:extLst>
+              <a:ext uri="{FF2B5EF4-FFF2-40B4-BE49-F238E27FC236}">
+                <a16:creationId xmlns:a16="http://schemas.microsoft.com/office/drawing/2014/main" id="{02D3F2CD-F297-4F4F-971E-4F08AE818F74}"/>
+              </a:ext>
+            </a:extLst>
+          </p:cNvPr>
+          <p:cNvSpPr>
+            <a:spLocks noGrp="1"/>
+          </p:cNvSpPr>
+          <p:nvPr>
+            <p:ph type="ftr" sz="quarter" idx="11"/>
+          </p:nvPr>
+        </p:nvSpPr>
+        <p:spPr/>
+        <p:txBody>
+          <a:bodyPr/>
+          <a:lstStyle/>
+          <a:p>
+            <a:r>
+              <a:rPr lang="de-DE" dirty="0" err="1"/>
+              <a:t>Advanced</a:t>
+            </a:r>
+            <a:r>
+              <a:rPr lang="de-DE" dirty="0"/>
+              <a:t> BDD / Maik Wagner / © </a:t>
+            </a:r>
+            <a:r>
+              <a:rPr lang="de-DE" dirty="0" err="1"/>
+              <a:t>Tallence</a:t>
+            </a:r>
+            <a:r>
+              <a:rPr lang="de-DE" dirty="0"/>
+              <a:t> AG</a:t>
+            </a:r>
+          </a:p>
+        </p:txBody>
+      </p:sp>
+      <p:sp>
+        <p:nvSpPr>
+          <p:cNvPr id="7" name="Datumsplatzhalter 6">
+            <a:extLst>
+              <a:ext uri="{FF2B5EF4-FFF2-40B4-BE49-F238E27FC236}">
+                <a16:creationId xmlns:a16="http://schemas.microsoft.com/office/drawing/2014/main" id="{8B2967E2-B842-364C-B506-7FDEA079194B}"/>
+              </a:ext>
+            </a:extLst>
+          </p:cNvPr>
+          <p:cNvSpPr>
+            <a:spLocks noGrp="1"/>
+          </p:cNvSpPr>
+          <p:nvPr>
+            <p:ph type="dt" sz="half" idx="10"/>
+          </p:nvPr>
+        </p:nvSpPr>
+        <p:spPr/>
+        <p:txBody>
+          <a:bodyPr/>
+          <a:lstStyle/>
+          <a:p>
+            <a:fld id="{154C7814-F218-4D9E-8E58-25588F0986B1}" type="datetime1">
+              <a:rPr lang="de-DE" noProof="0" smtClean="0"/>
+              <a:t>25.11.2019</a:t>
+            </a:fld>
+            <a:endParaRPr lang="de-DE" noProof="0" dirty="0"/>
+          </a:p>
+        </p:txBody>
+      </p:sp>
+      <p:sp>
+        <p:nvSpPr>
+          <p:cNvPr id="8" name="Foliennummernplatzhalter 7">
+            <a:extLst>
+              <a:ext uri="{FF2B5EF4-FFF2-40B4-BE49-F238E27FC236}">
+                <a16:creationId xmlns:a16="http://schemas.microsoft.com/office/drawing/2014/main" id="{5424C73D-5505-BB45-95C9-C44624D5BAEC}"/>
+              </a:ext>
+            </a:extLst>
+          </p:cNvPr>
+          <p:cNvSpPr>
+            <a:spLocks noGrp="1"/>
+          </p:cNvSpPr>
+          <p:nvPr>
+            <p:ph type="sldNum" sz="quarter" idx="12"/>
+          </p:nvPr>
+        </p:nvSpPr>
+        <p:spPr/>
+        <p:txBody>
+          <a:bodyPr/>
+          <a:lstStyle/>
+          <a:p>
+            <a:fld id="{02CEFE82-39F2-4F47-8A0C-D5AB3496FA5C}" type="slidenum">
+              <a:rPr lang="de-DE" noProof="0" smtClean="0"/>
+              <a:pPr/>
+              <a:t>6</a:t>
+            </a:fld>
+            <a:endParaRPr lang="de-DE" noProof="0" dirty="0"/>
+          </a:p>
+        </p:txBody>
+      </p:sp>
+      <p:sp>
+        <p:nvSpPr>
+          <p:cNvPr id="11" name="Inhaltsplatzhalter 4">
+            <a:extLst>
+              <a:ext uri="{FF2B5EF4-FFF2-40B4-BE49-F238E27FC236}">
+                <a16:creationId xmlns:a16="http://schemas.microsoft.com/office/drawing/2014/main" id="{4F716437-B2F7-4AFB-A57E-8677A883C7D6}"/>
+              </a:ext>
+            </a:extLst>
+          </p:cNvPr>
+          <p:cNvSpPr txBox="1">
+            <a:spLocks/>
+          </p:cNvSpPr>
+          <p:nvPr/>
+        </p:nvSpPr>
+        <p:spPr bwMode="gray">
+          <a:xfrm>
+            <a:off x="755998" y="2247259"/>
+            <a:ext cx="10373751" cy="2142162"/>
+          </a:xfrm>
+          <a:prstGeom prst="rect">
+            <a:avLst/>
+          </a:prstGeom>
+        </p:spPr>
+        <p:txBody>
+          <a:bodyPr vert="horz" lIns="0" tIns="0" rIns="0" bIns="0" rtlCol="0">
+            <a:noAutofit/>
+          </a:bodyPr>
+          <a:lstStyle>
+            <a:lvl1pPr marL="270000" indent="-270000" algn="l" defTabSz="914400" rtl="0" eaLnBrk="1" latinLnBrk="0" hangingPunct="1">
+              <a:lnSpc>
+                <a:spcPct val="120000"/>
+              </a:lnSpc>
+              <a:spcBef>
+                <a:spcPts val="0"/>
+              </a:spcBef>
+              <a:spcAft>
+                <a:spcPts val="1000"/>
+              </a:spcAft>
+              <a:buClr>
+                <a:schemeClr val="tx1"/>
+              </a:buClr>
+              <a:buSzPct val="100000"/>
+              <a:buFont typeface="Arial" panose="020F0502020204030204" pitchFamily="34" charset="0"/>
+              <a:buChar char="&gt;"/>
+              <a:defRPr sz="1800" kern="1200">
+                <a:solidFill>
+                  <a:schemeClr val="tx1"/>
+                </a:solidFill>
+                <a:latin typeface="+mn-lt"/>
+                <a:ea typeface="+mn-ea"/>
+                <a:cs typeface="+mn-cs"/>
+              </a:defRPr>
+            </a:lvl1pPr>
+            <a:lvl2pPr marL="720000" indent="-270000" algn="l" defTabSz="914400" rtl="0" eaLnBrk="1" latinLnBrk="0" hangingPunct="1">
+              <a:lnSpc>
+                <a:spcPct val="120000"/>
+              </a:lnSpc>
+              <a:spcBef>
+                <a:spcPts val="0"/>
+              </a:spcBef>
+              <a:spcAft>
+                <a:spcPts val="1000"/>
+              </a:spcAft>
+              <a:buClr>
+                <a:schemeClr val="tx1"/>
+              </a:buClr>
+              <a:buSzPct val="100000"/>
+              <a:buFont typeface="Arial" panose="020F0502020204030204" pitchFamily="34" charset="0"/>
+              <a:buChar char="&gt;"/>
+              <a:defRPr sz="1600" kern="1200">
+                <a:solidFill>
+                  <a:schemeClr val="tx1"/>
+                </a:solidFill>
+                <a:latin typeface="+mn-lt"/>
+                <a:ea typeface="+mn-ea"/>
+                <a:cs typeface="+mn-cs"/>
+              </a:defRPr>
+            </a:lvl2pPr>
+            <a:lvl3pPr marL="1080000" indent="-270000" algn="l" defTabSz="914400" rtl="0" eaLnBrk="1" latinLnBrk="0" hangingPunct="1">
+              <a:lnSpc>
+                <a:spcPct val="120000"/>
+              </a:lnSpc>
+              <a:spcBef>
+                <a:spcPts val="0"/>
+              </a:spcBef>
+              <a:spcAft>
+                <a:spcPts val="1000"/>
+              </a:spcAft>
+              <a:buClr>
+                <a:schemeClr val="tx1"/>
+              </a:buClr>
+              <a:buSzPct val="100000"/>
+              <a:buFont typeface="Arial" panose="020F0502020204030204" pitchFamily="34" charset="0"/>
+              <a:buChar char="&gt;"/>
+              <a:defRPr sz="1600" kern="1200">
+                <a:solidFill>
+                  <a:schemeClr val="tx1"/>
+                </a:solidFill>
+                <a:latin typeface="+mn-lt"/>
+                <a:ea typeface="+mn-ea"/>
+                <a:cs typeface="+mn-cs"/>
+              </a:defRPr>
+            </a:lvl3pPr>
+            <a:lvl4pPr marL="1440000" indent="-270000" algn="l" defTabSz="914400" rtl="0" eaLnBrk="1" latinLnBrk="0" hangingPunct="1">
+              <a:lnSpc>
+                <a:spcPct val="120000"/>
+              </a:lnSpc>
+              <a:spcBef>
+                <a:spcPts val="0"/>
+              </a:spcBef>
+              <a:spcAft>
+                <a:spcPts val="1000"/>
+              </a:spcAft>
+              <a:buClr>
+                <a:schemeClr val="tx1"/>
+              </a:buClr>
+              <a:buSzPct val="100000"/>
+              <a:buFont typeface="Arial" panose="020F0502020204030204" pitchFamily="34" charset="0"/>
+              <a:buChar char="&gt;"/>
+              <a:defRPr sz="1600" kern="1200">
+                <a:solidFill>
+                  <a:schemeClr val="tx1"/>
+                </a:solidFill>
+                <a:latin typeface="+mn-lt"/>
+                <a:ea typeface="+mn-ea"/>
+                <a:cs typeface="+mn-cs"/>
+              </a:defRPr>
+            </a:lvl4pPr>
+            <a:lvl5pPr marL="1800000" indent="-270000" algn="l" defTabSz="914400" rtl="0" eaLnBrk="1" latinLnBrk="0" hangingPunct="1">
+              <a:lnSpc>
+                <a:spcPct val="120000"/>
+              </a:lnSpc>
+              <a:spcBef>
+                <a:spcPts val="0"/>
+              </a:spcBef>
+              <a:spcAft>
+                <a:spcPts val="1000"/>
+              </a:spcAft>
+              <a:buClr>
+                <a:schemeClr val="tx1"/>
+              </a:buClr>
+              <a:buSzPct val="100000"/>
+              <a:buFont typeface="Arial" panose="020F0502020204030204" pitchFamily="34" charset="0"/>
+              <a:buChar char="&gt;"/>
+              <a:defRPr sz="1600" kern="1200">
+                <a:solidFill>
+                  <a:schemeClr val="tx1"/>
+                </a:solidFill>
+                <a:latin typeface="+mn-lt"/>
+                <a:ea typeface="+mn-ea"/>
+                <a:cs typeface="+mn-cs"/>
+              </a:defRPr>
+            </a:lvl5pPr>
+            <a:lvl6pPr marL="2514600" indent="-228600" algn="l" defTabSz="914400" rtl="0" eaLnBrk="1" latinLnBrk="0" hangingPunct="1">
+              <a:spcBef>
+                <a:spcPct val="20000"/>
+              </a:spcBef>
+              <a:buFont typeface="Arial" panose="020B0604020202020204" pitchFamily="34" charset="0"/>
+              <a:buChar char="•"/>
+              <a:defRPr sz="1800" kern="1200">
+                <a:solidFill>
+                  <a:schemeClr val="tx1"/>
+                </a:solidFill>
+                <a:latin typeface="+mn-lt"/>
+                <a:ea typeface="+mn-ea"/>
+                <a:cs typeface="+mn-cs"/>
+              </a:defRPr>
+            </a:lvl6pPr>
+            <a:lvl7pPr marL="2971800" indent="-228600" algn="l" defTabSz="914400" rtl="0" eaLnBrk="1" latinLnBrk="0" hangingPunct="1">
+              <a:spcBef>
+                <a:spcPct val="20000"/>
+              </a:spcBef>
+              <a:buFont typeface="Arial" panose="020B0604020202020204" pitchFamily="34" charset="0"/>
+              <a:buChar char="•"/>
+              <a:defRPr sz="1800" kern="1200">
+                <a:solidFill>
+                  <a:schemeClr val="tx1"/>
+                </a:solidFill>
+                <a:latin typeface="+mn-lt"/>
+                <a:ea typeface="+mn-ea"/>
+                <a:cs typeface="+mn-cs"/>
+              </a:defRPr>
+            </a:lvl7pPr>
+            <a:lvl8pPr marL="3429000" indent="-228600" algn="l" defTabSz="914400" rtl="0" eaLnBrk="1" latinLnBrk="0" hangingPunct="1">
+              <a:spcBef>
+                <a:spcPct val="20000"/>
+              </a:spcBef>
+              <a:buFont typeface="Arial" panose="020B0604020202020204" pitchFamily="34" charset="0"/>
+              <a:buChar char="•"/>
+              <a:defRPr sz="1800" kern="1200">
+                <a:solidFill>
+                  <a:schemeClr val="tx1"/>
+                </a:solidFill>
+                <a:latin typeface="+mn-lt"/>
+                <a:ea typeface="+mn-ea"/>
+                <a:cs typeface="+mn-cs"/>
+              </a:defRPr>
+            </a:lvl8pPr>
+            <a:lvl9pPr marL="3886200" indent="-228600" algn="l" defTabSz="914400" rtl="0" eaLnBrk="1" latinLnBrk="0" hangingPunct="1">
+              <a:spcBef>
+                <a:spcPct val="20000"/>
+              </a:spcBef>
+              <a:buFont typeface="Arial" panose="020B0604020202020204" pitchFamily="34" charset="0"/>
+              <a:buChar char="•"/>
+              <a:defRPr sz="1800" kern="1200">
+                <a:solidFill>
+                  <a:schemeClr val="tx1"/>
+                </a:solidFill>
+                <a:latin typeface="+mn-lt"/>
+                <a:ea typeface="+mn-ea"/>
+                <a:cs typeface="+mn-cs"/>
+              </a:defRPr>
+            </a:lvl9pPr>
+          </a:lstStyle>
+          <a:p>
+            <a:pPr marL="450000" lvl="1" indent="0">
+              <a:buNone/>
+            </a:pPr>
+            <a:r>
+              <a:rPr lang="de-DE" dirty="0"/>
+              <a:t>Szenario 1: Ein Nutzer meldet sich mit dem Benutzernamen und Passwort erfolgreich an</a:t>
+            </a:r>
+          </a:p>
+          <a:p>
+            <a:pPr marL="450000" lvl="1" indent="0">
+              <a:buNone/>
+            </a:pPr>
+            <a:endParaRPr lang="de-DE" dirty="0"/>
+          </a:p>
+          <a:p>
+            <a:pPr marL="450000" lvl="1" indent="0">
+              <a:buNone/>
+            </a:pPr>
+            <a:r>
+              <a:rPr lang="de-DE" b="1" dirty="0"/>
+              <a:t>Gegeben</a:t>
+            </a:r>
+            <a:r>
+              <a:rPr lang="de-DE" dirty="0"/>
+              <a:t> ist ein Nutzer mit Benutzername </a:t>
+            </a:r>
+            <a:r>
+              <a:rPr lang="de-DE" i="1" dirty="0"/>
+              <a:t>mw01</a:t>
+            </a:r>
+            <a:r>
+              <a:rPr lang="de-DE" dirty="0"/>
+              <a:t> und Passwort </a:t>
+            </a:r>
+            <a:r>
+              <a:rPr lang="de-DE" i="1" dirty="0"/>
+              <a:t>123456</a:t>
+            </a:r>
+          </a:p>
+          <a:p>
+            <a:pPr marL="450000" lvl="1" indent="0">
+              <a:buNone/>
+            </a:pPr>
+            <a:r>
+              <a:rPr lang="de-DE" b="1" dirty="0"/>
+              <a:t>Wenn</a:t>
+            </a:r>
+            <a:r>
+              <a:rPr lang="de-DE" dirty="0"/>
+              <a:t> der Nutzer den Benutzernamen </a:t>
+            </a:r>
+            <a:r>
+              <a:rPr lang="de-DE" i="1" dirty="0"/>
+              <a:t>mw01</a:t>
+            </a:r>
+            <a:r>
+              <a:rPr lang="de-DE" dirty="0"/>
+              <a:t> und das Passwort </a:t>
+            </a:r>
+            <a:r>
+              <a:rPr lang="de-DE" i="1" dirty="0"/>
+              <a:t>123456</a:t>
+            </a:r>
+            <a:r>
+              <a:rPr lang="de-DE" dirty="0"/>
+              <a:t>  eingibt</a:t>
+            </a:r>
+          </a:p>
+          <a:p>
+            <a:pPr marL="450000" lvl="1" indent="0">
+              <a:buNone/>
+            </a:pPr>
+            <a:r>
+              <a:rPr lang="de-DE" b="1" dirty="0"/>
+              <a:t>Dann</a:t>
+            </a:r>
+            <a:r>
+              <a:rPr lang="de-DE" dirty="0"/>
+              <a:t> ist der Benutzer angemeldet und wird auf die Startseite weitergeleitet</a:t>
+            </a:r>
+          </a:p>
+          <a:p>
+            <a:pPr lvl="1"/>
+            <a:endParaRPr lang="de-DE" dirty="0"/>
+          </a:p>
+          <a:p>
+            <a:r>
+              <a:rPr lang="de-DE" dirty="0"/>
+              <a:t>Gemeinsame Fach-Sprache</a:t>
+            </a:r>
+          </a:p>
+          <a:p>
+            <a:r>
+              <a:rPr lang="de-DE" dirty="0"/>
+              <a:t>Besprechung der fachlichen Details – keine Technik!</a:t>
+            </a:r>
+          </a:p>
+        </p:txBody>
+      </p:sp>
+    </p:spTree>
+    <p:extLst>
+      <p:ext uri="{BB962C8B-B14F-4D97-AF65-F5344CB8AC3E}">
+        <p14:creationId xmlns:p14="http://schemas.microsoft.com/office/powerpoint/2010/main" val="612266239"/>
+      </p:ext>
+    </p:extLst>
+  </p:cSld>
+  <p:clrMapOvr>
+    <a:masterClrMapping/>
+  </p:clrMapOvr>
+  <mc:AlternateContent xmlns:mc="http://schemas.openxmlformats.org/markup-compatibility/2006" xmlns:p14="http://schemas.microsoft.com/office/powerpoint/2010/main">
+    <mc:Choice Requires="p14">
+      <p:transition spd="med" p14:dur="700">
+        <p:fade/>
+      </p:transition>
+    </mc:Choice>
+    <mc:Fallback xmlns="">
+      <p:transition spd="med">
+        <p:fade/>
+      </p:transition>
+    </mc:Fallback>
+  </mc:AlternateContent>
+</p:sld>
+</file>
+
+<file path=ppt/slides/slide7.xml><?xml version="1.0" encoding="utf-8"?>
+<p:sld xmlns:a="http://schemas.openxmlformats.org/drawingml/2006/main" xmlns:r="http://schemas.openxmlformats.org/officeDocument/2006/relationships" xmlns:p="http://schemas.openxmlformats.org/presentationml/2006/main">
+  <p:cSld>
+    <p:spTree>
+      <p:nvGrpSpPr>
+        <p:cNvPr id="1" name=""/>
+        <p:cNvGrpSpPr/>
+        <p:nvPr/>
+      </p:nvGrpSpPr>
+      <p:grpSpPr>
+        <a:xfrm>
+          <a:off x="0" y="0"/>
+          <a:ext cx="0" cy="0"/>
+          <a:chOff x="0" y="0"/>
+          <a:chExt cx="0" cy="0"/>
+        </a:xfrm>
+      </p:grpSpPr>
+      <p:sp>
+        <p:nvSpPr>
+          <p:cNvPr id="2" name="Titel 1">
+            <a:extLst>
+              <a:ext uri="{FF2B5EF4-FFF2-40B4-BE49-F238E27FC236}">
+                <a16:creationId xmlns:a16="http://schemas.microsoft.com/office/drawing/2014/main" id="{896A6613-F3F0-5945-9BFC-BB4411304B7F}"/>
+              </a:ext>
+            </a:extLst>
+          </p:cNvPr>
+          <p:cNvSpPr>
+            <a:spLocks noGrp="1"/>
+          </p:cNvSpPr>
+          <p:nvPr>
+            <p:ph type="title"/>
+          </p:nvPr>
+        </p:nvSpPr>
+        <p:spPr/>
+        <p:txBody>
+          <a:bodyPr/>
+          <a:lstStyle/>
+          <a:p>
+            <a:r>
+              <a:rPr lang="de-DE" dirty="0"/>
+              <a:t>BDD - </a:t>
+            </a:r>
+            <a:r>
+              <a:rPr lang="de-DE" dirty="0" err="1"/>
+              <a:t>Behaviour</a:t>
+            </a:r>
+            <a:r>
+              <a:rPr lang="de-DE" dirty="0"/>
+              <a:t>-Driven Development</a:t>
+            </a:r>
+            <a:br>
+              <a:rPr lang="de-DE" dirty="0"/>
+            </a:br>
+            <a:endParaRPr lang="de-DE" dirty="0"/>
+          </a:p>
+        </p:txBody>
+      </p:sp>
+      <p:sp>
+        <p:nvSpPr>
+          <p:cNvPr id="3" name="Textplatzhalter 2">
+            <a:extLst>
+              <a:ext uri="{FF2B5EF4-FFF2-40B4-BE49-F238E27FC236}">
+                <a16:creationId xmlns:a16="http://schemas.microsoft.com/office/drawing/2014/main" id="{C2783B6D-2F09-8B41-94FE-416F35F0FEFD}"/>
+              </a:ext>
+            </a:extLst>
+          </p:cNvPr>
+          <p:cNvSpPr>
+            <a:spLocks noGrp="1"/>
+          </p:cNvSpPr>
+          <p:nvPr>
+            <p:ph type="body" sz="quarter" idx="13"/>
+          </p:nvPr>
+        </p:nvSpPr>
+        <p:spPr/>
+        <p:txBody>
+          <a:bodyPr/>
+          <a:lstStyle/>
+          <a:p>
+            <a:r>
+              <a:rPr lang="de-DE" dirty="0"/>
+              <a:t>Einleitung - Szenarios – schlechter Stil</a:t>
+            </a:r>
+          </a:p>
+        </p:txBody>
+      </p:sp>
+      <p:sp>
+        <p:nvSpPr>
+          <p:cNvPr id="4" name="Textplatzhalter 3">
+            <a:extLst>
+              <a:ext uri="{FF2B5EF4-FFF2-40B4-BE49-F238E27FC236}">
+                <a16:creationId xmlns:a16="http://schemas.microsoft.com/office/drawing/2014/main" id="{5DECD20D-115D-9347-AA3F-FF8E5B0AF70E}"/>
+              </a:ext>
+            </a:extLst>
+          </p:cNvPr>
+          <p:cNvSpPr>
+            <a:spLocks noGrp="1"/>
+          </p:cNvSpPr>
+          <p:nvPr>
+            <p:ph type="body" sz="quarter" idx="22"/>
+          </p:nvPr>
+        </p:nvSpPr>
+        <p:spPr/>
+        <p:txBody>
+          <a:bodyPr/>
+          <a:lstStyle/>
+          <a:p>
+            <a:endParaRPr lang="de-DE"/>
+          </a:p>
+        </p:txBody>
+      </p:sp>
+      <p:sp>
+        <p:nvSpPr>
+          <p:cNvPr id="5" name="Inhaltsplatzhalter 4">
+            <a:extLst>
+              <a:ext uri="{FF2B5EF4-FFF2-40B4-BE49-F238E27FC236}">
+                <a16:creationId xmlns:a16="http://schemas.microsoft.com/office/drawing/2014/main" id="{D295D297-BE66-D74A-8741-3B72EE2A0CD0}"/>
+              </a:ext>
+            </a:extLst>
+          </p:cNvPr>
+          <p:cNvSpPr>
+            <a:spLocks noGrp="1"/>
+          </p:cNvSpPr>
+          <p:nvPr>
+            <p:ph sz="half" idx="14"/>
+          </p:nvPr>
+        </p:nvSpPr>
+        <p:spPr>
+          <a:xfrm>
+            <a:off x="756000" y="1512000"/>
+            <a:ext cx="8872496" cy="507869"/>
+          </a:xfrm>
+        </p:spPr>
+        <p:txBody>
+          <a:bodyPr/>
+          <a:lstStyle/>
+          <a:p>
+            <a:r>
+              <a:rPr lang="de-DE" dirty="0"/>
+              <a:t>Szenarios – </a:t>
+            </a:r>
+            <a:r>
+              <a:rPr lang="de-DE" b="1" dirty="0"/>
+              <a:t>schlechter Stil</a:t>
+            </a:r>
+            <a:endParaRPr lang="de-DE" dirty="0"/>
+          </a:p>
+          <a:p>
+            <a:endParaRPr lang="de-DE" dirty="0"/>
+          </a:p>
+        </p:txBody>
+      </p:sp>
+      <p:sp>
+        <p:nvSpPr>
+          <p:cNvPr id="6" name="Fußzeilenplatzhalter 5">
+            <a:extLst>
+              <a:ext uri="{FF2B5EF4-FFF2-40B4-BE49-F238E27FC236}">
+                <a16:creationId xmlns:a16="http://schemas.microsoft.com/office/drawing/2014/main" id="{02D3F2CD-F297-4F4F-971E-4F08AE818F74}"/>
+              </a:ext>
+            </a:extLst>
+          </p:cNvPr>
+          <p:cNvSpPr>
+            <a:spLocks noGrp="1"/>
+          </p:cNvSpPr>
+          <p:nvPr>
+            <p:ph type="ftr" sz="quarter" idx="11"/>
+          </p:nvPr>
+        </p:nvSpPr>
+        <p:spPr/>
+        <p:txBody>
+          <a:bodyPr/>
+          <a:lstStyle/>
+          <a:p>
+            <a:r>
+              <a:rPr lang="de-DE" dirty="0" err="1"/>
+              <a:t>Advanced</a:t>
+            </a:r>
+            <a:r>
+              <a:rPr lang="de-DE" dirty="0"/>
+              <a:t> BDD / Maik Wagner / © </a:t>
+            </a:r>
+            <a:r>
+              <a:rPr lang="de-DE" dirty="0" err="1"/>
+              <a:t>Tallence</a:t>
+            </a:r>
+            <a:r>
+              <a:rPr lang="de-DE" dirty="0"/>
+              <a:t> AG</a:t>
+            </a:r>
+          </a:p>
+        </p:txBody>
+      </p:sp>
+      <p:sp>
+        <p:nvSpPr>
+          <p:cNvPr id="7" name="Datumsplatzhalter 6">
+            <a:extLst>
+              <a:ext uri="{FF2B5EF4-FFF2-40B4-BE49-F238E27FC236}">
+                <a16:creationId xmlns:a16="http://schemas.microsoft.com/office/drawing/2014/main" id="{8B2967E2-B842-364C-B506-7FDEA079194B}"/>
+              </a:ext>
+            </a:extLst>
+          </p:cNvPr>
+          <p:cNvSpPr>
+            <a:spLocks noGrp="1"/>
+          </p:cNvSpPr>
+          <p:nvPr>
+            <p:ph type="dt" sz="half" idx="10"/>
+          </p:nvPr>
+        </p:nvSpPr>
+        <p:spPr/>
+        <p:txBody>
+          <a:bodyPr/>
+          <a:lstStyle/>
+          <a:p>
+            <a:fld id="{154C7814-F218-4D9E-8E58-25588F0986B1}" type="datetime1">
+              <a:rPr lang="de-DE" noProof="0" smtClean="0"/>
+              <a:t>25.11.2019</a:t>
+            </a:fld>
+            <a:endParaRPr lang="de-DE" noProof="0" dirty="0"/>
+          </a:p>
+        </p:txBody>
+      </p:sp>
+      <p:sp>
+        <p:nvSpPr>
+          <p:cNvPr id="8" name="Foliennummernplatzhalter 7">
+            <a:extLst>
+              <a:ext uri="{FF2B5EF4-FFF2-40B4-BE49-F238E27FC236}">
+                <a16:creationId xmlns:a16="http://schemas.microsoft.com/office/drawing/2014/main" id="{5424C73D-5505-BB45-95C9-C44624D5BAEC}"/>
+              </a:ext>
+            </a:extLst>
+          </p:cNvPr>
+          <p:cNvSpPr>
+            <a:spLocks noGrp="1"/>
+          </p:cNvSpPr>
+          <p:nvPr>
+            <p:ph type="sldNum" sz="quarter" idx="12"/>
+          </p:nvPr>
+        </p:nvSpPr>
+        <p:spPr/>
+        <p:txBody>
+          <a:bodyPr/>
+          <a:lstStyle/>
+          <a:p>
+            <a:fld id="{02CEFE82-39F2-4F47-8A0C-D5AB3496FA5C}" type="slidenum">
+              <a:rPr lang="de-DE" noProof="0" smtClean="0"/>
+              <a:pPr/>
+              <a:t>7</a:t>
+            </a:fld>
+            <a:endParaRPr lang="de-DE" noProof="0" dirty="0"/>
+          </a:p>
+        </p:txBody>
+      </p:sp>
+      <p:sp>
+        <p:nvSpPr>
+          <p:cNvPr id="11" name="Inhaltsplatzhalter 4">
+            <a:extLst>
+              <a:ext uri="{FF2B5EF4-FFF2-40B4-BE49-F238E27FC236}">
+                <a16:creationId xmlns:a16="http://schemas.microsoft.com/office/drawing/2014/main" id="{4F716437-B2F7-4AFB-A57E-8677A883C7D6}"/>
+              </a:ext>
+            </a:extLst>
+          </p:cNvPr>
+          <p:cNvSpPr txBox="1">
+            <a:spLocks/>
+          </p:cNvSpPr>
+          <p:nvPr/>
+        </p:nvSpPr>
+        <p:spPr bwMode="gray">
+          <a:xfrm>
+            <a:off x="482686" y="2274555"/>
+            <a:ext cx="10373751" cy="2945714"/>
+          </a:xfrm>
+          <a:prstGeom prst="rect">
+            <a:avLst/>
+          </a:prstGeom>
+        </p:spPr>
+        <p:txBody>
+          <a:bodyPr vert="horz" lIns="0" tIns="0" rIns="0" bIns="0" rtlCol="0">
+            <a:noAutofit/>
+          </a:bodyPr>
+          <a:lstStyle>
+            <a:lvl1pPr marL="270000" indent="-270000" algn="l" defTabSz="914400" rtl="0" eaLnBrk="1" latinLnBrk="0" hangingPunct="1">
+              <a:lnSpc>
+                <a:spcPct val="120000"/>
+              </a:lnSpc>
+              <a:spcBef>
+                <a:spcPts val="0"/>
+              </a:spcBef>
+              <a:spcAft>
+                <a:spcPts val="1000"/>
+              </a:spcAft>
+              <a:buClr>
+                <a:schemeClr val="tx1"/>
+              </a:buClr>
+              <a:buSzPct val="100000"/>
+              <a:buFont typeface="Arial" panose="020F0502020204030204" pitchFamily="34" charset="0"/>
+              <a:buChar char="&gt;"/>
+              <a:defRPr sz="1800" kern="1200">
+                <a:solidFill>
+                  <a:schemeClr val="tx1"/>
+                </a:solidFill>
+                <a:latin typeface="+mn-lt"/>
+                <a:ea typeface="+mn-ea"/>
+                <a:cs typeface="+mn-cs"/>
+              </a:defRPr>
+            </a:lvl1pPr>
+            <a:lvl2pPr marL="720000" indent="-270000" algn="l" defTabSz="914400" rtl="0" eaLnBrk="1" latinLnBrk="0" hangingPunct="1">
+              <a:lnSpc>
+                <a:spcPct val="120000"/>
+              </a:lnSpc>
+              <a:spcBef>
+                <a:spcPts val="0"/>
+              </a:spcBef>
+              <a:spcAft>
+                <a:spcPts val="1000"/>
+              </a:spcAft>
+              <a:buClr>
+                <a:schemeClr val="tx1"/>
+              </a:buClr>
+              <a:buSzPct val="100000"/>
+              <a:buFont typeface="Arial" panose="020F0502020204030204" pitchFamily="34" charset="0"/>
+              <a:buChar char="&gt;"/>
+              <a:defRPr sz="1600" kern="1200">
+                <a:solidFill>
+                  <a:schemeClr val="tx1"/>
+                </a:solidFill>
+                <a:latin typeface="+mn-lt"/>
+                <a:ea typeface="+mn-ea"/>
+                <a:cs typeface="+mn-cs"/>
+              </a:defRPr>
+            </a:lvl2pPr>
+            <a:lvl3pPr marL="1080000" indent="-270000" algn="l" defTabSz="914400" rtl="0" eaLnBrk="1" latinLnBrk="0" hangingPunct="1">
+              <a:lnSpc>
+                <a:spcPct val="120000"/>
+              </a:lnSpc>
+              <a:spcBef>
+                <a:spcPts val="0"/>
+              </a:spcBef>
+              <a:spcAft>
+                <a:spcPts val="1000"/>
+              </a:spcAft>
+              <a:buClr>
+                <a:schemeClr val="tx1"/>
+              </a:buClr>
+              <a:buSzPct val="100000"/>
+              <a:buFont typeface="Arial" panose="020F0502020204030204" pitchFamily="34" charset="0"/>
+              <a:buChar char="&gt;"/>
+              <a:defRPr sz="1600" kern="1200">
+                <a:solidFill>
+                  <a:schemeClr val="tx1"/>
+                </a:solidFill>
+                <a:latin typeface="+mn-lt"/>
+                <a:ea typeface="+mn-ea"/>
+                <a:cs typeface="+mn-cs"/>
+              </a:defRPr>
+            </a:lvl3pPr>
+            <a:lvl4pPr marL="1440000" indent="-270000" algn="l" defTabSz="914400" rtl="0" eaLnBrk="1" latinLnBrk="0" hangingPunct="1">
+              <a:lnSpc>
+                <a:spcPct val="120000"/>
+              </a:lnSpc>
+              <a:spcBef>
+                <a:spcPts val="0"/>
+              </a:spcBef>
+              <a:spcAft>
+                <a:spcPts val="1000"/>
+              </a:spcAft>
+              <a:buClr>
+                <a:schemeClr val="tx1"/>
+              </a:buClr>
+              <a:buSzPct val="100000"/>
+              <a:buFont typeface="Arial" panose="020F0502020204030204" pitchFamily="34" charset="0"/>
+              <a:buChar char="&gt;"/>
+              <a:defRPr sz="1600" kern="1200">
+                <a:solidFill>
+                  <a:schemeClr val="tx1"/>
+                </a:solidFill>
+                <a:latin typeface="+mn-lt"/>
+                <a:ea typeface="+mn-ea"/>
+                <a:cs typeface="+mn-cs"/>
+              </a:defRPr>
+            </a:lvl4pPr>
+            <a:lvl5pPr marL="1800000" indent="-270000" algn="l" defTabSz="914400" rtl="0" eaLnBrk="1" latinLnBrk="0" hangingPunct="1">
+              <a:lnSpc>
+                <a:spcPct val="120000"/>
+              </a:lnSpc>
+              <a:spcBef>
+                <a:spcPts val="0"/>
+              </a:spcBef>
+              <a:spcAft>
+                <a:spcPts val="1000"/>
+              </a:spcAft>
+              <a:buClr>
+                <a:schemeClr val="tx1"/>
+              </a:buClr>
+              <a:buSzPct val="100000"/>
+              <a:buFont typeface="Arial" panose="020F0502020204030204" pitchFamily="34" charset="0"/>
+              <a:buChar char="&gt;"/>
+              <a:defRPr sz="1600" kern="1200">
+                <a:solidFill>
+                  <a:schemeClr val="tx1"/>
+                </a:solidFill>
+                <a:latin typeface="+mn-lt"/>
+                <a:ea typeface="+mn-ea"/>
+                <a:cs typeface="+mn-cs"/>
+              </a:defRPr>
+            </a:lvl5pPr>
+            <a:lvl6pPr marL="2514600" indent="-228600" algn="l" defTabSz="914400" rtl="0" eaLnBrk="1" latinLnBrk="0" hangingPunct="1">
+              <a:spcBef>
+                <a:spcPct val="20000"/>
+              </a:spcBef>
+              <a:buFont typeface="Arial" panose="020B0604020202020204" pitchFamily="34" charset="0"/>
+              <a:buChar char="•"/>
+              <a:defRPr sz="1800" kern="1200">
+                <a:solidFill>
+                  <a:schemeClr val="tx1"/>
+                </a:solidFill>
+                <a:latin typeface="+mn-lt"/>
+                <a:ea typeface="+mn-ea"/>
+                <a:cs typeface="+mn-cs"/>
+              </a:defRPr>
+            </a:lvl6pPr>
+            <a:lvl7pPr marL="2971800" indent="-228600" algn="l" defTabSz="914400" rtl="0" eaLnBrk="1" latinLnBrk="0" hangingPunct="1">
+              <a:spcBef>
+                <a:spcPct val="20000"/>
+              </a:spcBef>
+              <a:buFont typeface="Arial" panose="020B0604020202020204" pitchFamily="34" charset="0"/>
+              <a:buChar char="•"/>
+              <a:defRPr sz="1800" kern="1200">
+                <a:solidFill>
+                  <a:schemeClr val="tx1"/>
+                </a:solidFill>
+                <a:latin typeface="+mn-lt"/>
+                <a:ea typeface="+mn-ea"/>
+                <a:cs typeface="+mn-cs"/>
+              </a:defRPr>
+            </a:lvl7pPr>
+            <a:lvl8pPr marL="3429000" indent="-228600" algn="l" defTabSz="914400" rtl="0" eaLnBrk="1" latinLnBrk="0" hangingPunct="1">
+              <a:spcBef>
+                <a:spcPct val="20000"/>
+              </a:spcBef>
+              <a:buFont typeface="Arial" panose="020B0604020202020204" pitchFamily="34" charset="0"/>
+              <a:buChar char="•"/>
+              <a:defRPr sz="1800" kern="1200">
+                <a:solidFill>
+                  <a:schemeClr val="tx1"/>
+                </a:solidFill>
+                <a:latin typeface="+mn-lt"/>
+                <a:ea typeface="+mn-ea"/>
+                <a:cs typeface="+mn-cs"/>
+              </a:defRPr>
+            </a:lvl8pPr>
+            <a:lvl9pPr marL="3886200" indent="-228600" algn="l" defTabSz="914400" rtl="0" eaLnBrk="1" latinLnBrk="0" hangingPunct="1">
+              <a:spcBef>
+                <a:spcPct val="20000"/>
+              </a:spcBef>
+              <a:buFont typeface="Arial" panose="020B0604020202020204" pitchFamily="34" charset="0"/>
+              <a:buChar char="•"/>
+              <a:defRPr sz="1800" kern="1200">
+                <a:solidFill>
+                  <a:schemeClr val="tx1"/>
+                </a:solidFill>
+                <a:latin typeface="+mn-lt"/>
+                <a:ea typeface="+mn-ea"/>
+                <a:cs typeface="+mn-cs"/>
+              </a:defRPr>
+            </a:lvl9pPr>
+          </a:lstStyle>
+          <a:p>
+            <a:pPr marL="450000" lvl="1" indent="0">
+              <a:buNone/>
+            </a:pPr>
+            <a:r>
+              <a:rPr lang="de-DE" dirty="0"/>
+              <a:t>Szenario 1: Ein Nutzer meldet sich mit dem Benutzernamen und Passwort erfolgreich an</a:t>
+            </a:r>
+          </a:p>
+          <a:p>
+            <a:pPr marL="450000" lvl="1" indent="0">
+              <a:buNone/>
+            </a:pPr>
+            <a:endParaRPr lang="de-DE" dirty="0"/>
+          </a:p>
+          <a:p>
+            <a:pPr marL="450000" lvl="1" indent="0">
+              <a:buNone/>
+            </a:pPr>
+            <a:r>
+              <a:rPr lang="de-DE" b="1" dirty="0"/>
+              <a:t>Gegeben</a:t>
+            </a:r>
+            <a:r>
+              <a:rPr lang="de-DE" dirty="0"/>
+              <a:t> in die Tabelle Users wird ein Eintrag hinzugefügt und in die Spalte </a:t>
+            </a:r>
+            <a:r>
+              <a:rPr lang="de-DE" dirty="0" err="1"/>
+              <a:t>userName</a:t>
+            </a:r>
+            <a:r>
+              <a:rPr lang="de-DE" dirty="0"/>
+              <a:t> wird </a:t>
+            </a:r>
+            <a:r>
+              <a:rPr lang="de-DE" i="1" dirty="0"/>
+              <a:t>mw01</a:t>
+            </a:r>
+            <a:r>
+              <a:rPr lang="de-DE" dirty="0"/>
+              <a:t> und in die Spalte pw01 </a:t>
+            </a:r>
+            <a:r>
+              <a:rPr lang="de-DE" i="1" dirty="0"/>
+              <a:t>123456</a:t>
+            </a:r>
+          </a:p>
+          <a:p>
+            <a:pPr marL="450000" lvl="1" indent="0">
+              <a:buNone/>
+            </a:pPr>
+            <a:r>
+              <a:rPr lang="de-DE" b="1" dirty="0"/>
+              <a:t>Wenn</a:t>
+            </a:r>
+            <a:r>
+              <a:rPr lang="de-DE" dirty="0"/>
+              <a:t> in des Eingabefeld </a:t>
+            </a:r>
+            <a:r>
+              <a:rPr lang="de-DE" dirty="0" err="1"/>
+              <a:t>username_input</a:t>
+            </a:r>
+            <a:r>
+              <a:rPr lang="de-DE" dirty="0"/>
+              <a:t> </a:t>
+            </a:r>
+            <a:r>
+              <a:rPr lang="de-DE" i="1" dirty="0"/>
+              <a:t>mw01</a:t>
+            </a:r>
+            <a:r>
+              <a:rPr lang="de-DE" dirty="0"/>
+              <a:t> und in des Eingabefeld </a:t>
+            </a:r>
+            <a:r>
+              <a:rPr lang="de-DE" dirty="0" err="1"/>
+              <a:t>pw_input</a:t>
+            </a:r>
+            <a:r>
+              <a:rPr lang="de-DE" dirty="0"/>
+              <a:t> </a:t>
+            </a:r>
+            <a:r>
+              <a:rPr lang="de-DE" i="1" dirty="0"/>
+              <a:t>123456</a:t>
+            </a:r>
+            <a:r>
+              <a:rPr lang="de-DE" dirty="0"/>
+              <a:t> gesetzt werden</a:t>
+            </a:r>
+          </a:p>
+          <a:p>
+            <a:pPr marL="450000" lvl="1" indent="0">
+              <a:buNone/>
+            </a:pPr>
+            <a:r>
+              <a:rPr lang="de-DE" b="1" dirty="0"/>
+              <a:t>Dann</a:t>
+            </a:r>
+            <a:r>
+              <a:rPr lang="de-DE" dirty="0"/>
+              <a:t> wird der Nutzer auf die Seite /start.html weitergeleitet</a:t>
+            </a:r>
+          </a:p>
+          <a:p>
+            <a:pPr marL="450000" lvl="1" indent="0">
+              <a:buNone/>
+            </a:pPr>
+            <a:r>
+              <a:rPr lang="de-DE" b="1" dirty="0"/>
+              <a:t>Und</a:t>
+            </a:r>
+            <a:r>
+              <a:rPr lang="de-DE" dirty="0"/>
+              <a:t> das Cookie JSESSIONID wurde geschrieben.</a:t>
+            </a:r>
+          </a:p>
+          <a:p>
+            <a:pPr lvl="1"/>
+            <a:endParaRPr lang="de-DE" dirty="0"/>
+          </a:p>
+          <a:p>
+            <a:r>
+              <a:rPr lang="de-DE" b="1" dirty="0"/>
+              <a:t>Empfehlung: Vermeidung technische Beschreibung</a:t>
+            </a:r>
+            <a:endParaRPr lang="de-DE" dirty="0"/>
+          </a:p>
+          <a:p>
+            <a:endParaRPr lang="de-DE" dirty="0"/>
+          </a:p>
+        </p:txBody>
+      </p:sp>
+    </p:spTree>
+    <p:extLst>
+      <p:ext uri="{BB962C8B-B14F-4D97-AF65-F5344CB8AC3E}">
+        <p14:creationId xmlns:p14="http://schemas.microsoft.com/office/powerpoint/2010/main" val="1380031683"/>
+      </p:ext>
+    </p:extLst>
+  </p:cSld>
+  <p:clrMapOvr>
+    <a:masterClrMapping/>
+  </p:clrMapOvr>
+  <mc:AlternateContent xmlns:mc="http://schemas.openxmlformats.org/markup-compatibility/2006" xmlns:p14="http://schemas.microsoft.com/office/powerpoint/2010/main">
+    <mc:Choice Requires="p14">
+      <p:transition spd="med" p14:dur="700">
+        <p:fade/>
+      </p:transition>
+    </mc:Choice>
+    <mc:Fallback xmlns="">
+      <p:transition spd="med">
+        <p:fade/>
+      </p:transition>
+    </mc:Fallback>
+  </mc:AlternateContent>
+</p:sld>
+</file>
+
+<file path=ppt/slides/slide8.xml><?xml version="1.0" encoding="utf-8"?>
+<p:sld xmlns:a="http://schemas.openxmlformats.org/drawingml/2006/main" xmlns:r="http://schemas.openxmlformats.org/officeDocument/2006/relationships" xmlns:p="http://schemas.openxmlformats.org/presentationml/2006/main">
+  <p:cSld>
+    <p:spTree>
+      <p:nvGrpSpPr>
+        <p:cNvPr id="1" name=""/>
+        <p:cNvGrpSpPr/>
+        <p:nvPr/>
+      </p:nvGrpSpPr>
+      <p:grpSpPr>
+        <a:xfrm>
+          <a:off x="0" y="0"/>
+          <a:ext cx="0" cy="0"/>
+          <a:chOff x="0" y="0"/>
+          <a:chExt cx="0" cy="0"/>
+        </a:xfrm>
+      </p:grpSpPr>
+      <p:sp>
+        <p:nvSpPr>
           <p:cNvPr id="9" name="Titel 8">
             <a:extLst>
               <a:ext uri="{FF2B5EF4-FFF2-40B4-BE49-F238E27FC236}">
@@ -42130,7 +44320,7 @@
           <a:p>
             <a:fld id="{154C7814-F218-4D9E-8E58-25588F0986B1}" type="datetime1">
               <a:rPr lang="de-DE" noProof="0" smtClean="0"/>
-              <a:t>29.10.19</a:t>
+              <a:t>25.11.2019</a:t>
             </a:fld>
             <a:endParaRPr lang="de-DE" noProof="0" dirty="0"/>
           </a:p>
@@ -42165,7 +44355,7 @@
             <a:fld id="{02CEFE82-39F2-4F47-8A0C-D5AB3496FA5C}" type="slidenum">
               <a:rPr lang="de-DE" noProof="0" smtClean="0"/>
               <a:pPr/>
-              <a:t>6</a:t>
+              <a:t>8</a:t>
             </a:fld>
             <a:endParaRPr lang="de-DE" noProof="0" dirty="0"/>
           </a:p>
@@ -42196,7 +44386,7 @@
 </p:sld>
 </file>
 
-<file path=ppt/slides/slide7.xml><?xml version="1.0" encoding="utf-8"?>
+<file path=ppt/slides/slide9.xml><?xml version="1.0" encoding="utf-8"?>
 <p:sld xmlns:a="http://schemas.openxmlformats.org/drawingml/2006/main" xmlns:r="http://schemas.openxmlformats.org/officeDocument/2006/relationships" xmlns:p="http://schemas.openxmlformats.org/presentationml/2006/main">
   <p:cSld>
     <p:bg>
@@ -42463,7 +44653,7 @@
           <a:p>
             <a:fld id="{154C7814-F218-4D9E-8E58-25588F0986B1}" type="datetime1">
               <a:rPr lang="de-DE" noProof="0" smtClean="0"/>
-              <a:t>29.10.19</a:t>
+              <a:t>25.11.2019</a:t>
             </a:fld>
             <a:endParaRPr lang="de-DE" noProof="0" dirty="0"/>
           </a:p>
@@ -42493,7 +44683,7 @@
             <a:fld id="{02CEFE82-39F2-4F47-8A0C-D5AB3496FA5C}" type="slidenum">
               <a:rPr lang="de-DE" noProof="0" smtClean="0"/>
               <a:pPr/>
-              <a:t>7</a:t>
+              <a:t>9</a:t>
             </a:fld>
             <a:endParaRPr lang="de-DE" noProof="0" dirty="0"/>
           </a:p>
@@ -42527,7 +44717,7 @@
           <a:graphicData uri="http://schemas.openxmlformats.org/presentationml/2006/ole">
             <mc:AlternateContent xmlns:mc="http://schemas.openxmlformats.org/markup-compatibility/2006">
               <mc:Choice xmlns:v="urn:schemas-microsoft-com:vml" Requires="v">
-                <p:oleObj spid="_x0000_s1060" name="Dokument" r:id="rId3" imgW="9144000" imgH="190500" progId="Word.Document.12">
+                <p:oleObj spid="_x0000_s1062" name="Dokument" r:id="rId3" imgW="9144000" imgH="190500" progId="Word.Document.12">
                   <p:embed/>
                 </p:oleObj>
               </mc:Choice>
@@ -43381,566 +45571,6 @@
     <p:extLst>
       <p:ext uri="{BB962C8B-B14F-4D97-AF65-F5344CB8AC3E}">
         <p14:creationId xmlns:p14="http://schemas.microsoft.com/office/powerpoint/2010/main" val="145777830"/>
-      </p:ext>
-    </p:extLst>
-  </p:cSld>
-  <p:clrMapOvr>
-    <a:masterClrMapping/>
-  </p:clrMapOvr>
-  <mc:AlternateContent xmlns:mc="http://schemas.openxmlformats.org/markup-compatibility/2006" xmlns:p14="http://schemas.microsoft.com/office/powerpoint/2010/main">
-    <mc:Choice Requires="p14">
-      <p:transition spd="med" p14:dur="700">
-        <p:fade/>
-      </p:transition>
-    </mc:Choice>
-    <mc:Fallback xmlns="">
-      <p:transition spd="med">
-        <p:fade/>
-      </p:transition>
-    </mc:Fallback>
-  </mc:AlternateContent>
-</p:sld>
-</file>
-
-<file path=ppt/slides/slide8.xml><?xml version="1.0" encoding="utf-8"?>
-<p:sld xmlns:a="http://schemas.openxmlformats.org/drawingml/2006/main" xmlns:r="http://schemas.openxmlformats.org/officeDocument/2006/relationships" xmlns:p="http://schemas.openxmlformats.org/presentationml/2006/main">
-  <p:cSld>
-    <p:spTree>
-      <p:nvGrpSpPr>
-        <p:cNvPr id="1" name=""/>
-        <p:cNvGrpSpPr/>
-        <p:nvPr/>
-      </p:nvGrpSpPr>
-      <p:grpSpPr>
-        <a:xfrm>
-          <a:off x="0" y="0"/>
-          <a:ext cx="0" cy="0"/>
-          <a:chOff x="0" y="0"/>
-          <a:chExt cx="0" cy="0"/>
-        </a:xfrm>
-      </p:grpSpPr>
-      <p:sp>
-        <p:nvSpPr>
-          <p:cNvPr id="2" name="Titel 1">
-            <a:extLst>
-              <a:ext uri="{FF2B5EF4-FFF2-40B4-BE49-F238E27FC236}">
-                <a16:creationId xmlns:a16="http://schemas.microsoft.com/office/drawing/2014/main" id="{7630BFA5-D5C1-5841-B9FB-5851961ACD75}"/>
-              </a:ext>
-            </a:extLst>
-          </p:cNvPr>
-          <p:cNvSpPr>
-            <a:spLocks noGrp="1"/>
-          </p:cNvSpPr>
-          <p:nvPr>
-            <p:ph type="title"/>
-          </p:nvPr>
-        </p:nvSpPr>
-        <p:spPr/>
-        <p:txBody>
-          <a:bodyPr/>
-          <a:lstStyle/>
-          <a:p>
-            <a:r>
-              <a:rPr lang="de-DE" dirty="0"/>
-              <a:t>Frameworks</a:t>
-            </a:r>
-          </a:p>
-        </p:txBody>
-      </p:sp>
-      <p:sp>
-        <p:nvSpPr>
-          <p:cNvPr id="3" name="Textplatzhalter 2">
-            <a:extLst>
-              <a:ext uri="{FF2B5EF4-FFF2-40B4-BE49-F238E27FC236}">
-                <a16:creationId xmlns:a16="http://schemas.microsoft.com/office/drawing/2014/main" id="{E13B0A18-2C1A-A14A-AA7E-EE9B740659E3}"/>
-              </a:ext>
-            </a:extLst>
-          </p:cNvPr>
-          <p:cNvSpPr>
-            <a:spLocks noGrp="1"/>
-          </p:cNvSpPr>
-          <p:nvPr>
-            <p:ph type="body" sz="quarter" idx="13"/>
-          </p:nvPr>
-        </p:nvSpPr>
-        <p:spPr/>
-        <p:txBody>
-          <a:bodyPr/>
-          <a:lstStyle/>
-          <a:p>
-            <a:r>
-              <a:rPr lang="de-DE" dirty="0" err="1"/>
-              <a:t>Selenium</a:t>
-            </a:r>
-            <a:endParaRPr lang="de-DE" dirty="0"/>
-          </a:p>
-        </p:txBody>
-      </p:sp>
-      <p:sp>
-        <p:nvSpPr>
-          <p:cNvPr id="4" name="Textplatzhalter 3">
-            <a:extLst>
-              <a:ext uri="{FF2B5EF4-FFF2-40B4-BE49-F238E27FC236}">
-                <a16:creationId xmlns:a16="http://schemas.microsoft.com/office/drawing/2014/main" id="{F158517A-3EDC-BC45-84B7-468D446159A8}"/>
-              </a:ext>
-            </a:extLst>
-          </p:cNvPr>
-          <p:cNvSpPr>
-            <a:spLocks noGrp="1"/>
-          </p:cNvSpPr>
-          <p:nvPr>
-            <p:ph type="body" sz="quarter" idx="22"/>
-          </p:nvPr>
-        </p:nvSpPr>
-        <p:spPr/>
-        <p:txBody>
-          <a:bodyPr/>
-          <a:lstStyle/>
-          <a:p>
-            <a:endParaRPr lang="de-DE"/>
-          </a:p>
-        </p:txBody>
-      </p:sp>
-      <p:sp>
-        <p:nvSpPr>
-          <p:cNvPr id="5" name="Inhaltsplatzhalter 4">
-            <a:extLst>
-              <a:ext uri="{FF2B5EF4-FFF2-40B4-BE49-F238E27FC236}">
-                <a16:creationId xmlns:a16="http://schemas.microsoft.com/office/drawing/2014/main" id="{A01AC294-80A2-C245-9A1C-2F9DB3418C93}"/>
-              </a:ext>
-            </a:extLst>
-          </p:cNvPr>
-          <p:cNvSpPr>
-            <a:spLocks noGrp="1"/>
-          </p:cNvSpPr>
-          <p:nvPr>
-            <p:ph sz="half" idx="14"/>
-          </p:nvPr>
-        </p:nvSpPr>
-        <p:spPr>
-          <a:xfrm>
-            <a:off x="756000" y="1512000"/>
-            <a:ext cx="11037600" cy="4298400"/>
-          </a:xfrm>
-        </p:spPr>
-        <p:txBody>
-          <a:bodyPr/>
-          <a:lstStyle/>
-          <a:p>
-            <a:r>
-              <a:rPr lang="de-DE" dirty="0"/>
-              <a:t>Automatisierung von Browsern</a:t>
-            </a:r>
-          </a:p>
-          <a:p>
-            <a:r>
-              <a:rPr lang="de-DE" dirty="0"/>
-              <a:t>Page-</a:t>
-            </a:r>
-            <a:r>
-              <a:rPr lang="de-DE" dirty="0" err="1"/>
-              <a:t>Object</a:t>
-            </a:r>
-            <a:r>
-              <a:rPr lang="de-DE" dirty="0"/>
-              <a:t>-Pattern</a:t>
-            </a:r>
-          </a:p>
-        </p:txBody>
-      </p:sp>
-      <p:sp>
-        <p:nvSpPr>
-          <p:cNvPr id="6" name="Fußzeilenplatzhalter 5">
-            <a:extLst>
-              <a:ext uri="{FF2B5EF4-FFF2-40B4-BE49-F238E27FC236}">
-                <a16:creationId xmlns:a16="http://schemas.microsoft.com/office/drawing/2014/main" id="{C6168411-E865-6D49-839B-2960823AEA56}"/>
-              </a:ext>
-            </a:extLst>
-          </p:cNvPr>
-          <p:cNvSpPr>
-            <a:spLocks noGrp="1"/>
-          </p:cNvSpPr>
-          <p:nvPr>
-            <p:ph type="ftr" sz="quarter" idx="11"/>
-          </p:nvPr>
-        </p:nvSpPr>
-        <p:spPr/>
-        <p:txBody>
-          <a:bodyPr/>
-          <a:lstStyle/>
-          <a:p>
-            <a:r>
-              <a:rPr lang="de-DE" dirty="0" err="1"/>
-              <a:t>Advanced</a:t>
-            </a:r>
-            <a:r>
-              <a:rPr lang="de-DE" dirty="0"/>
-              <a:t> BDD / Maik Wagner / © </a:t>
-            </a:r>
-            <a:r>
-              <a:rPr lang="de-DE" dirty="0" err="1"/>
-              <a:t>Tallence</a:t>
-            </a:r>
-            <a:r>
-              <a:rPr lang="de-DE" dirty="0"/>
-              <a:t> AG</a:t>
-            </a:r>
-          </a:p>
-        </p:txBody>
-      </p:sp>
-      <p:sp>
-        <p:nvSpPr>
-          <p:cNvPr id="7" name="Datumsplatzhalter 6">
-            <a:extLst>
-              <a:ext uri="{FF2B5EF4-FFF2-40B4-BE49-F238E27FC236}">
-                <a16:creationId xmlns:a16="http://schemas.microsoft.com/office/drawing/2014/main" id="{9FAA6259-8E0C-5346-84AF-BD6FDD591C1B}"/>
-              </a:ext>
-            </a:extLst>
-          </p:cNvPr>
-          <p:cNvSpPr>
-            <a:spLocks noGrp="1"/>
-          </p:cNvSpPr>
-          <p:nvPr>
-            <p:ph type="dt" sz="half" idx="10"/>
-          </p:nvPr>
-        </p:nvSpPr>
-        <p:spPr/>
-        <p:txBody>
-          <a:bodyPr/>
-          <a:lstStyle/>
-          <a:p>
-            <a:fld id="{154C7814-F218-4D9E-8E58-25588F0986B1}" type="datetime1">
-              <a:rPr lang="de-DE" noProof="0" smtClean="0"/>
-              <a:t>29.10.19</a:t>
-            </a:fld>
-            <a:endParaRPr lang="de-DE" noProof="0" dirty="0"/>
-          </a:p>
-        </p:txBody>
-      </p:sp>
-      <p:sp>
-        <p:nvSpPr>
-          <p:cNvPr id="8" name="Foliennummernplatzhalter 7">
-            <a:extLst>
-              <a:ext uri="{FF2B5EF4-FFF2-40B4-BE49-F238E27FC236}">
-                <a16:creationId xmlns:a16="http://schemas.microsoft.com/office/drawing/2014/main" id="{02FFAC50-D076-404C-8ED2-57CF0978543C}"/>
-              </a:ext>
-            </a:extLst>
-          </p:cNvPr>
-          <p:cNvSpPr>
-            <a:spLocks noGrp="1"/>
-          </p:cNvSpPr>
-          <p:nvPr>
-            <p:ph type="sldNum" sz="quarter" idx="12"/>
-          </p:nvPr>
-        </p:nvSpPr>
-        <p:spPr/>
-        <p:txBody>
-          <a:bodyPr/>
-          <a:lstStyle/>
-          <a:p>
-            <a:fld id="{02CEFE82-39F2-4F47-8A0C-D5AB3496FA5C}" type="slidenum">
-              <a:rPr lang="de-DE" noProof="0" smtClean="0"/>
-              <a:pPr/>
-              <a:t>8</a:t>
-            </a:fld>
-            <a:endParaRPr lang="de-DE" noProof="0" dirty="0"/>
-          </a:p>
-        </p:txBody>
-      </p:sp>
-      <p:graphicFrame>
-        <p:nvGraphicFramePr>
-          <p:cNvPr id="10" name="Diagramm 9">
-            <a:extLst>
-              <a:ext uri="{FF2B5EF4-FFF2-40B4-BE49-F238E27FC236}">
-                <a16:creationId xmlns:a16="http://schemas.microsoft.com/office/drawing/2014/main" id="{5B964A70-728D-E14C-BB7E-9EDA7EC110B1}"/>
-              </a:ext>
-            </a:extLst>
-          </p:cNvPr>
-          <p:cNvGraphicFramePr/>
-          <p:nvPr>
-            <p:extLst>
-              <p:ext uri="{D42A27DB-BD31-4B8C-83A1-F6EECF244321}">
-                <p14:modId xmlns:p14="http://schemas.microsoft.com/office/powerpoint/2010/main" val="4253762703"/>
-              </p:ext>
-            </p:extLst>
-          </p:nvPr>
-        </p:nvGraphicFramePr>
-        <p:xfrm>
-          <a:off x="895792" y="2456762"/>
-          <a:ext cx="10398827" cy="3272010"/>
-        </p:xfrm>
-        <a:graphic>
-          <a:graphicData uri="http://schemas.openxmlformats.org/drawingml/2006/diagram">
-            <dgm:relIds xmlns:dgm="http://schemas.openxmlformats.org/drawingml/2006/diagram" xmlns:r="http://schemas.openxmlformats.org/officeDocument/2006/relationships" r:dm="rId2" r:lo="rId3" r:qs="rId4" r:cs="rId5"/>
-          </a:graphicData>
-        </a:graphic>
-      </p:graphicFrame>
-    </p:spTree>
-    <p:extLst>
-      <p:ext uri="{BB962C8B-B14F-4D97-AF65-F5344CB8AC3E}">
-        <p14:creationId xmlns:p14="http://schemas.microsoft.com/office/powerpoint/2010/main" val="1810371097"/>
-      </p:ext>
-    </p:extLst>
-  </p:cSld>
-  <p:clrMapOvr>
-    <a:masterClrMapping/>
-  </p:clrMapOvr>
-  <mc:AlternateContent xmlns:mc="http://schemas.openxmlformats.org/markup-compatibility/2006" xmlns:p14="http://schemas.microsoft.com/office/powerpoint/2010/main">
-    <mc:Choice Requires="p14">
-      <p:transition spd="med" p14:dur="700">
-        <p:fade/>
-      </p:transition>
-    </mc:Choice>
-    <mc:Fallback xmlns="">
-      <p:transition spd="med">
-        <p:fade/>
-      </p:transition>
-    </mc:Fallback>
-  </mc:AlternateContent>
-</p:sld>
-</file>
-
-<file path=ppt/slides/slide9.xml><?xml version="1.0" encoding="utf-8"?>
-<p:sld xmlns:a="http://schemas.openxmlformats.org/drawingml/2006/main" xmlns:r="http://schemas.openxmlformats.org/officeDocument/2006/relationships" xmlns:p="http://schemas.openxmlformats.org/presentationml/2006/main">
-  <p:cSld>
-    <p:spTree>
-      <p:nvGrpSpPr>
-        <p:cNvPr id="1" name=""/>
-        <p:cNvGrpSpPr/>
-        <p:nvPr/>
-      </p:nvGrpSpPr>
-      <p:grpSpPr>
-        <a:xfrm>
-          <a:off x="0" y="0"/>
-          <a:ext cx="0" cy="0"/>
-          <a:chOff x="0" y="0"/>
-          <a:chExt cx="0" cy="0"/>
-        </a:xfrm>
-      </p:grpSpPr>
-      <p:sp>
-        <p:nvSpPr>
-          <p:cNvPr id="9" name="Titel 8">
-            <a:extLst>
-              <a:ext uri="{FF2B5EF4-FFF2-40B4-BE49-F238E27FC236}">
-                <a16:creationId xmlns:a16="http://schemas.microsoft.com/office/drawing/2014/main" id="{48B8340E-24BB-F94C-A724-801E6666D3DD}"/>
-              </a:ext>
-            </a:extLst>
-          </p:cNvPr>
-          <p:cNvSpPr>
-            <a:spLocks noGrp="1"/>
-          </p:cNvSpPr>
-          <p:nvPr>
-            <p:ph type="ctrTitle"/>
-          </p:nvPr>
-        </p:nvSpPr>
-        <p:spPr/>
-        <p:txBody>
-          <a:bodyPr/>
-          <a:lstStyle/>
-          <a:p>
-            <a:r>
-              <a:rPr lang="de-DE" dirty="0"/>
-              <a:t>Beispielanwendung</a:t>
-            </a:r>
-          </a:p>
-        </p:txBody>
-      </p:sp>
-      <p:sp>
-        <p:nvSpPr>
-          <p:cNvPr id="11" name="Textplatzhalter 10">
-            <a:extLst>
-              <a:ext uri="{FF2B5EF4-FFF2-40B4-BE49-F238E27FC236}">
-                <a16:creationId xmlns:a16="http://schemas.microsoft.com/office/drawing/2014/main" id="{9F260F2E-84AC-AA42-B61C-0AC43FA79A0C}"/>
-              </a:ext>
-            </a:extLst>
-          </p:cNvPr>
-          <p:cNvSpPr>
-            <a:spLocks noGrp="1"/>
-          </p:cNvSpPr>
-          <p:nvPr>
-            <p:ph type="body" sz="quarter" idx="14"/>
-          </p:nvPr>
-        </p:nvSpPr>
-        <p:spPr/>
-        <p:txBody>
-          <a:bodyPr/>
-          <a:lstStyle/>
-          <a:p>
-            <a:endParaRPr lang="de-DE"/>
-          </a:p>
-        </p:txBody>
-      </p:sp>
-      <p:sp>
-        <p:nvSpPr>
-          <p:cNvPr id="10" name="Textplatzhalter 9">
-            <a:extLst>
-              <a:ext uri="{FF2B5EF4-FFF2-40B4-BE49-F238E27FC236}">
-                <a16:creationId xmlns:a16="http://schemas.microsoft.com/office/drawing/2014/main" id="{F28D25E4-D47B-A244-94E1-EB61CD9566E5}"/>
-              </a:ext>
-            </a:extLst>
-          </p:cNvPr>
-          <p:cNvSpPr>
-            <a:spLocks noGrp="1"/>
-          </p:cNvSpPr>
-          <p:nvPr>
-            <p:ph type="body" sz="quarter" idx="11"/>
-          </p:nvPr>
-        </p:nvSpPr>
-        <p:spPr/>
-        <p:txBody>
-          <a:bodyPr/>
-          <a:lstStyle/>
-          <a:p>
-            <a:r>
-              <a:rPr lang="de-DE" dirty="0"/>
-              <a:t>3.</a:t>
-            </a:r>
-          </a:p>
-        </p:txBody>
-      </p:sp>
-      <p:sp>
-        <p:nvSpPr>
-          <p:cNvPr id="12" name="Textplatzhalter 11">
-            <a:extLst>
-              <a:ext uri="{FF2B5EF4-FFF2-40B4-BE49-F238E27FC236}">
-                <a16:creationId xmlns:a16="http://schemas.microsoft.com/office/drawing/2014/main" id="{47F875E8-011E-5F4F-927C-2594AB18C1B9}"/>
-              </a:ext>
-            </a:extLst>
-          </p:cNvPr>
-          <p:cNvSpPr>
-            <a:spLocks noGrp="1"/>
-          </p:cNvSpPr>
-          <p:nvPr>
-            <p:ph type="body" sz="quarter" idx="87"/>
-          </p:nvPr>
-        </p:nvSpPr>
-        <p:spPr/>
-        <p:txBody>
-          <a:bodyPr/>
-          <a:lstStyle/>
-          <a:p>
-            <a:endParaRPr lang="de-DE"/>
-          </a:p>
-        </p:txBody>
-      </p:sp>
-      <p:sp>
-        <p:nvSpPr>
-          <p:cNvPr id="6" name="Fußzeilenplatzhalter 5">
-            <a:extLst>
-              <a:ext uri="{FF2B5EF4-FFF2-40B4-BE49-F238E27FC236}">
-                <a16:creationId xmlns:a16="http://schemas.microsoft.com/office/drawing/2014/main" id="{78BA0521-E38C-C74B-94DE-1E59B74FC0AB}"/>
-              </a:ext>
-            </a:extLst>
-          </p:cNvPr>
-          <p:cNvSpPr>
-            <a:spLocks noGrp="1"/>
-          </p:cNvSpPr>
-          <p:nvPr>
-            <p:ph type="ftr" sz="quarter" idx="4294967295"/>
-          </p:nvPr>
-        </p:nvSpPr>
-        <p:spPr>
-          <a:xfrm>
-            <a:off x="0" y="6291263"/>
-            <a:ext cx="5556250" cy="360362"/>
-          </a:xfrm>
-        </p:spPr>
-        <p:txBody>
-          <a:bodyPr/>
-          <a:lstStyle/>
-          <a:p>
-            <a:r>
-              <a:rPr lang="de-DE" dirty="0" err="1"/>
-              <a:t>Advanced</a:t>
-            </a:r>
-            <a:r>
-              <a:rPr lang="de-DE" dirty="0"/>
-              <a:t> BDD / Maik Wagner / © </a:t>
-            </a:r>
-            <a:r>
-              <a:rPr lang="de-DE" dirty="0" err="1"/>
-              <a:t>Tallence</a:t>
-            </a:r>
-            <a:r>
-              <a:rPr lang="de-DE" dirty="0"/>
-              <a:t> AG</a:t>
-            </a:r>
-          </a:p>
-        </p:txBody>
-      </p:sp>
-      <p:sp>
-        <p:nvSpPr>
-          <p:cNvPr id="7" name="Datumsplatzhalter 6">
-            <a:extLst>
-              <a:ext uri="{FF2B5EF4-FFF2-40B4-BE49-F238E27FC236}">
-                <a16:creationId xmlns:a16="http://schemas.microsoft.com/office/drawing/2014/main" id="{B436E0FD-E05A-A84C-9957-E5B7C6399E96}"/>
-              </a:ext>
-            </a:extLst>
-          </p:cNvPr>
-          <p:cNvSpPr>
-            <a:spLocks noGrp="1"/>
-          </p:cNvSpPr>
-          <p:nvPr>
-            <p:ph type="dt" sz="half" idx="4294967295"/>
-          </p:nvPr>
-        </p:nvSpPr>
-        <p:spPr>
-          <a:xfrm>
-            <a:off x="11501438" y="6291263"/>
-            <a:ext cx="688975" cy="360362"/>
-          </a:xfrm>
-        </p:spPr>
-        <p:txBody>
-          <a:bodyPr/>
-          <a:lstStyle/>
-          <a:p>
-            <a:fld id="{154C7814-F218-4D9E-8E58-25588F0986B1}" type="datetime1">
-              <a:rPr lang="de-DE" noProof="0" smtClean="0"/>
-              <a:t>29.10.19</a:t>
-            </a:fld>
-            <a:endParaRPr lang="de-DE" noProof="0" dirty="0"/>
-          </a:p>
-        </p:txBody>
-      </p:sp>
-      <p:sp>
-        <p:nvSpPr>
-          <p:cNvPr id="8" name="Foliennummernplatzhalter 7">
-            <a:extLst>
-              <a:ext uri="{FF2B5EF4-FFF2-40B4-BE49-F238E27FC236}">
-                <a16:creationId xmlns:a16="http://schemas.microsoft.com/office/drawing/2014/main" id="{1B107D7B-A952-CC4A-80E8-151AB98DCA3E}"/>
-              </a:ext>
-            </a:extLst>
-          </p:cNvPr>
-          <p:cNvSpPr>
-            <a:spLocks noGrp="1"/>
-          </p:cNvSpPr>
-          <p:nvPr>
-            <p:ph type="sldNum" sz="quarter" idx="4294967295"/>
-          </p:nvPr>
-        </p:nvSpPr>
-        <p:spPr>
-          <a:xfrm>
-            <a:off x="11909425" y="6291263"/>
-            <a:ext cx="280988" cy="360362"/>
-          </a:xfrm>
-        </p:spPr>
-        <p:txBody>
-          <a:bodyPr/>
-          <a:lstStyle/>
-          <a:p>
-            <a:fld id="{02CEFE82-39F2-4F47-8A0C-D5AB3496FA5C}" type="slidenum">
-              <a:rPr lang="de-DE" noProof="0" smtClean="0"/>
-              <a:pPr/>
-              <a:t>9</a:t>
-            </a:fld>
-            <a:endParaRPr lang="de-DE" noProof="0" dirty="0"/>
-          </a:p>
-        </p:txBody>
-      </p:sp>
-    </p:spTree>
-    <p:extLst>
-      <p:ext uri="{BB962C8B-B14F-4D97-AF65-F5344CB8AC3E}">
-        <p14:creationId xmlns:p14="http://schemas.microsoft.com/office/powerpoint/2010/main" val="514579875"/>
       </p:ext>
     </p:extLst>
   </p:cSld>

</xml_diff>